<commit_message>
Remove the PowerPoint generation guide and enhance image insertion logic in the presentation generator to preserve aspect ratio. Update logging for better clarity on image dimensions during insertion.
</commit_message>
<xml_diff>
--- a/output/escalation_report_2025-12-19.pptx
+++ b/output/escalation_report_2025-12-19.pptx
@@ -4488,10 +4488,94 @@
       </p:sp>
       <p:sp>
         <p:nvSpPr>
-          <p:cNvPr id="15" name="Rectangle 14"/>
-          <p:cNvSpPr/>
-          <p:nvPr/>
-        </p:nvSpPr>
+          <p:cNvPr id="16" name="TextBox 15"/>
+          <p:cNvSpPr txBox="1"/>
+          <p:nvPr/>
+        </p:nvSpPr>
+        <p:spPr>
+          <a:xfrm>
+            <a:off x="731520" y="4846320"/>
+            <a:ext cx="7680960" cy="731520"/>
+          </a:xfrm>
+          <a:prstGeom prst="rect">
+            <a:avLst/>
+          </a:prstGeom>
+          <a:noFill/>
+        </p:spPr>
+        <p:txBody>
+          <a:bodyPr wrap="square" lIns="182880" rIns="182880">
+            <a:spAutoFit/>
+          </a:bodyPr>
+          <a:lstStyle/>
+          <a:p>
+            <a:pPr algn="l">
+              <a:defRPr sz="1300">
+                <a:solidFill>
+                  <a:srgbClr val="343741"/>
+                </a:solidFill>
+                <a:latin typeface="Calibri"/>
+              </a:defRPr>
+            </a:pPr>
+            <a:r>
+              <a:t>• 34 escalations upgraded (12.7%) - CS raised severity based on business impact</a:t>
+            </a:r>
+            <a:br/>
+            <a:r>
+              <a:t>• 65 escalations de-escalated (24.3%) - CS reduced noise from vendor over-classification</a:t>
+            </a:r>
+          </a:p>
+        </p:txBody>
+      </p:sp>
+      <p:sp>
+        <p:nvSpPr>
+          <p:cNvPr id="17" name="TextBox 16"/>
+          <p:cNvSpPr txBox="1"/>
+          <p:nvPr/>
+        </p:nvSpPr>
+        <p:spPr>
+          <a:xfrm>
+            <a:off x="457200" y="4686300"/>
+            <a:ext cx="8229600" cy="274320"/>
+          </a:xfrm>
+          <a:prstGeom prst="rect">
+            <a:avLst/>
+          </a:prstGeom>
+          <a:noFill/>
+        </p:spPr>
+        <p:txBody>
+          <a:bodyPr wrap="square">
+            <a:spAutoFit/>
+          </a:bodyPr>
+          <a:lstStyle/>
+          <a:p>
+            <a:pPr algn="l">
+              <a:defRPr sz="1000" i="1">
+                <a:solidFill>
+                  <a:srgbClr val="343741"/>
+                </a:solidFill>
+                <a:latin typeface="Calibri"/>
+              </a:defRPr>
+            </a:pPr>
+            <a:r>
+              <a:t>Source: Vendor Severity (col 45) vs. Current Priority (col 13)</a:t>
+            </a:r>
+          </a:p>
+        </p:txBody>
+      </p:sp>
+      <p:pic>
+        <p:nvPicPr>
+          <p:cNvPr id="18" name="Picture 17" descr="sankey_chart.png"/>
+          <p:cNvPicPr>
+            <a:picLocks noChangeAspect="1"/>
+          </p:cNvPicPr>
+          <p:nvPr/>
+        </p:nvPicPr>
+        <p:blipFill>
+          <a:blip r:embed="rId2"/>
+          <a:stretch>
+            <a:fillRect/>
+          </a:stretch>
+        </p:blipFill>
         <p:spPr>
           <a:xfrm>
             <a:off x="731520" y="2834640"/>
@@ -4500,123 +4584,8 @@
           <a:prstGeom prst="rect">
             <a:avLst/>
           </a:prstGeom>
-          <a:solidFill>
-            <a:srgbClr val="FFFFFF"/>
-          </a:solidFill>
-          <a:ln w="12700">
-            <a:solidFill>
-              <a:srgbClr val="343741"/>
-            </a:solidFill>
-          </a:ln>
-        </p:spPr>
-        <p:style>
-          <a:lnRef idx="1">
-            <a:schemeClr val="accent1"/>
-          </a:lnRef>
-          <a:fillRef idx="3">
-            <a:schemeClr val="accent1"/>
-          </a:fillRef>
-          <a:effectRef idx="2">
-            <a:schemeClr val="accent1"/>
-          </a:effectRef>
-          <a:fontRef idx="minor">
-            <a:schemeClr val="lt1"/>
-          </a:fontRef>
-        </p:style>
-        <p:txBody>
-          <a:bodyPr rtlCol="0" anchor="t"/>
-          <a:lstStyle/>
-          <a:p>
-            <a:pPr algn="ctr">
-              <a:defRPr sz="1400">
-                <a:solidFill>
-                  <a:srgbClr val="343741"/>
-                </a:solidFill>
-                <a:latin typeface="Calibri"/>
-              </a:defRPr>
-            </a:pPr>
-            <a:r>
-              <a:t>[Chart: Severity Alignment Sankey - ID: severity_sankey]</a:t>
-            </a:r>
-          </a:p>
-        </p:txBody>
-      </p:sp>
-      <p:sp>
-        <p:nvSpPr>
-          <p:cNvPr id="16" name="TextBox 15"/>
-          <p:cNvSpPr txBox="1"/>
-          <p:nvPr/>
-        </p:nvSpPr>
-        <p:spPr>
-          <a:xfrm>
-            <a:off x="731520" y="4846320"/>
-            <a:ext cx="7680960" cy="731520"/>
-          </a:xfrm>
-          <a:prstGeom prst="rect">
-            <a:avLst/>
-          </a:prstGeom>
-          <a:noFill/>
-        </p:spPr>
-        <p:txBody>
-          <a:bodyPr wrap="square" lIns="182880" rIns="182880">
-            <a:spAutoFit/>
-          </a:bodyPr>
-          <a:lstStyle/>
-          <a:p>
-            <a:pPr algn="l">
-              <a:defRPr sz="1300">
-                <a:solidFill>
-                  <a:srgbClr val="343741"/>
-                </a:solidFill>
-                <a:latin typeface="Calibri"/>
-              </a:defRPr>
-            </a:pPr>
-            <a:r>
-              <a:t>• 34 escalations upgraded (12.7%) - CS raised severity based on business impact</a:t>
-            </a:r>
-            <a:br/>
-            <a:r>
-              <a:t>• 65 escalations de-escalated (24.3%) - CS reduced noise from vendor over-classification</a:t>
-            </a:r>
-          </a:p>
-        </p:txBody>
-      </p:sp>
-      <p:sp>
-        <p:nvSpPr>
-          <p:cNvPr id="17" name="TextBox 16"/>
-          <p:cNvSpPr txBox="1"/>
-          <p:nvPr/>
-        </p:nvSpPr>
-        <p:spPr>
-          <a:xfrm>
-            <a:off x="457200" y="4686300"/>
-            <a:ext cx="8229600" cy="274320"/>
-          </a:xfrm>
-          <a:prstGeom prst="rect">
-            <a:avLst/>
-          </a:prstGeom>
-          <a:noFill/>
-        </p:spPr>
-        <p:txBody>
-          <a:bodyPr wrap="square">
-            <a:spAutoFit/>
-          </a:bodyPr>
-          <a:lstStyle/>
-          <a:p>
-            <a:pPr algn="l">
-              <a:defRPr sz="1000" i="1">
-                <a:solidFill>
-                  <a:srgbClr val="343741"/>
-                </a:solidFill>
-                <a:latin typeface="Calibri"/>
-              </a:defRPr>
-            </a:pPr>
-            <a:r>
-              <a:t>Source: Vendor Severity (col 45) vs. Current Priority (col 13)</a:t>
-            </a:r>
-          </a:p>
-        </p:txBody>
-      </p:sp>
+        </p:spPr>
+      </p:pic>
     </p:spTree>
   </p:cSld>
   <p:clrMapOvr>
@@ -4716,61 +4685,6 @@
       </p:sp>
       <p:sp>
         <p:nvSpPr>
-          <p:cNvPr id="4" name="Rectangle 3"/>
-          <p:cNvSpPr/>
-          <p:nvPr/>
-        </p:nvSpPr>
-        <p:spPr>
-          <a:xfrm>
-            <a:off x="731520" y="1097280"/>
-            <a:ext cx="7680960" cy="2743200"/>
-          </a:xfrm>
-          <a:prstGeom prst="rect">
-            <a:avLst/>
-          </a:prstGeom>
-          <a:solidFill>
-            <a:srgbClr val="FFFFFF"/>
-          </a:solidFill>
-          <a:ln w="12700">
-            <a:solidFill>
-              <a:srgbClr val="343741"/>
-            </a:solidFill>
-          </a:ln>
-        </p:spPr>
-        <p:style>
-          <a:lnRef idx="1">
-            <a:schemeClr val="accent1"/>
-          </a:lnRef>
-          <a:fillRef idx="3">
-            <a:schemeClr val="accent1"/>
-          </a:fillRef>
-          <a:effectRef idx="2">
-            <a:schemeClr val="accent1"/>
-          </a:effectRef>
-          <a:fontRef idx="minor">
-            <a:schemeClr val="lt1"/>
-          </a:fontRef>
-        </p:style>
-        <p:txBody>
-          <a:bodyPr rtlCol="0" anchor="t"/>
-          <a:lstStyle/>
-          <a:p>
-            <a:pPr algn="ctr">
-              <a:defRPr sz="1400">
-                <a:solidFill>
-                  <a:srgbClr val="343741"/>
-                </a:solidFill>
-                <a:latin typeface="Calibri"/>
-              </a:defRPr>
-            </a:pPr>
-            <a:r>
-              <a:t>[Chart: MITRE ATT&amp;CK Stacked Bar - ID: mitre_stacked_bar]</a:t>
-            </a:r>
-          </a:p>
-        </p:txBody>
-      </p:sp>
-      <p:sp>
-        <p:nvSpPr>
           <p:cNvPr id="5" name="TextBox 4"/>
           <p:cNvSpPr txBox="1"/>
           <p:nvPr/>
@@ -4896,6 +4810,30 @@
           </a:p>
         </p:txBody>
       </p:sp>
+      <p:pic>
+        <p:nvPicPr>
+          <p:cNvPr id="8" name="Picture 7" descr="stacked_bar_chart.png"/>
+          <p:cNvPicPr>
+            <a:picLocks noChangeAspect="1"/>
+          </p:cNvPicPr>
+          <p:nvPr/>
+        </p:nvPicPr>
+        <p:blipFill>
+          <a:blip r:embed="rId2"/>
+          <a:stretch>
+            <a:fillRect/>
+          </a:stretch>
+        </p:blipFill>
+        <p:spPr>
+          <a:xfrm>
+            <a:off x="731520" y="1097280"/>
+            <a:ext cx="7680960" cy="2743200"/>
+          </a:xfrm>
+          <a:prstGeom prst="rect">
+            <a:avLst/>
+          </a:prstGeom>
+        </p:spPr>
+      </p:pic>
     </p:spTree>
   </p:cSld>
   <p:clrMapOvr>
@@ -9222,61 +9160,6 @@
       </p:sp>
       <p:sp>
         <p:nvSpPr>
-          <p:cNvPr id="4" name="Rectangle 3"/>
-          <p:cNvSpPr/>
-          <p:nvPr/>
-        </p:nvSpPr>
-        <p:spPr>
-          <a:xfrm>
-            <a:off x="731520" y="1097280"/>
-            <a:ext cx="7680960" cy="2560320"/>
-          </a:xfrm>
-          <a:prstGeom prst="rect">
-            <a:avLst/>
-          </a:prstGeom>
-          <a:solidFill>
-            <a:srgbClr val="FFFFFF"/>
-          </a:solidFill>
-          <a:ln w="12700">
-            <a:solidFill>
-              <a:srgbClr val="343741"/>
-            </a:solidFill>
-          </a:ln>
-        </p:spPr>
-        <p:style>
-          <a:lnRef idx="1">
-            <a:schemeClr val="accent1"/>
-          </a:lnRef>
-          <a:fillRef idx="3">
-            <a:schemeClr val="accent1"/>
-          </a:fillRef>
-          <a:effectRef idx="2">
-            <a:schemeClr val="accent1"/>
-          </a:effectRef>
-          <a:fontRef idx="minor">
-            <a:schemeClr val="lt1"/>
-          </a:fontRef>
-        </p:style>
-        <p:txBody>
-          <a:bodyPr rtlCol="0" anchor="t"/>
-          <a:lstStyle/>
-          <a:p>
-            <a:pPr algn="ctr">
-              <a:defRPr sz="1400">
-                <a:solidFill>
-                  <a:srgbClr val="343741"/>
-                </a:solidFill>
-                <a:latin typeface="Calibri"/>
-              </a:defRPr>
-            </a:pPr>
-            <a:r>
-              <a:t>[Chart: Performance Trends]</a:t>
-            </a:r>
-          </a:p>
-        </p:txBody>
-      </p:sp>
-      <p:sp>
-        <p:nvSpPr>
           <p:cNvPr id="5" name="TextBox 4"/>
           <p:cNvSpPr txBox="1"/>
           <p:nvPr/>
@@ -9366,6 +9249,30 @@
           </a:p>
         </p:txBody>
       </p:sp>
+      <p:pic>
+        <p:nvPicPr>
+          <p:cNvPr id="7" name="Picture 6" descr="trend_chart.png"/>
+          <p:cNvPicPr>
+            <a:picLocks noChangeAspect="1"/>
+          </p:cNvPicPr>
+          <p:nvPr/>
+        </p:nvPicPr>
+        <p:blipFill>
+          <a:blip r:embed="rId2"/>
+          <a:stretch>
+            <a:fillRect/>
+          </a:stretch>
+        </p:blipFill>
+        <p:spPr>
+          <a:xfrm>
+            <a:off x="731520" y="1097280"/>
+            <a:ext cx="7680960" cy="2560320"/>
+          </a:xfrm>
+          <a:prstGeom prst="rect">
+            <a:avLst/>
+          </a:prstGeom>
+        </p:spPr>
+      </p:pic>
     </p:spTree>
   </p:cSld>
   <p:clrMapOvr>

</xml_diff>

<commit_message>
Enhance PowerPoint generation system with new features and documentation. Added detailed breakdown slides for after-hours notifications, response efficiency, collaboration quality, and detection quality. Updated the data model in `report_data.py` to support new metrics. Introduced `ROADMAP.md` for phased improvements and `CURRENT_STATE.md` for system architecture documentation. Expanded README with new file descriptions and quick start instructions for generating presentations.
</commit_message>
<xml_diff>
--- a/output/escalation_report_2025-12-19.pptx
+++ b/output/escalation_report_2025-12-19.pptx
@@ -4,25 +4,28 @@
   <p:sldMasterIdLst>
     <p:sldMasterId id="2147483648" r:id="rId1"/>
   </p:sldMasterIdLst>
+  <p:notesMasterIdLst>
+    <p:notesMasterId r:id="rId18"/>
+  </p:notesMasterIdLst>
   <p:sldIdLst>
-    <p:sldId id="256" r:id="rId7"/>
-    <p:sldId id="257" r:id="rId8"/>
-    <p:sldId id="258" r:id="rId9"/>
-    <p:sldId id="259" r:id="rId10"/>
-    <p:sldId id="260" r:id="rId11"/>
-    <p:sldId id="261" r:id="rId12"/>
-    <p:sldId id="262" r:id="rId13"/>
-    <p:sldId id="263" r:id="rId14"/>
-    <p:sldId id="264" r:id="rId15"/>
-    <p:sldId id="265" r:id="rId16"/>
-    <p:sldId id="266" r:id="rId17"/>
-    <p:sldId id="267" r:id="rId18"/>
-    <p:sldId id="268" r:id="rId19"/>
-    <p:sldId id="269" r:id="rId20"/>
-    <p:sldId id="270" r:id="rId21"/>
-    <p:sldId id="271" r:id="rId22"/>
+    <p:sldId id="256" r:id="rId2"/>
+    <p:sldId id="257" r:id="rId3"/>
+    <p:sldId id="258" r:id="rId4"/>
+    <p:sldId id="259" r:id="rId5"/>
+    <p:sldId id="260" r:id="rId6"/>
+    <p:sldId id="261" r:id="rId7"/>
+    <p:sldId id="262" r:id="rId8"/>
+    <p:sldId id="263" r:id="rId9"/>
+    <p:sldId id="264" r:id="rId10"/>
+    <p:sldId id="265" r:id="rId11"/>
+    <p:sldId id="266" r:id="rId12"/>
+    <p:sldId id="267" r:id="rId13"/>
+    <p:sldId id="268" r:id="rId14"/>
+    <p:sldId id="269" r:id="rId15"/>
+    <p:sldId id="270" r:id="rId16"/>
+    <p:sldId id="271" r:id="rId17"/>
   </p:sldIdLst>
-  <p:sldSz cx="9144000" cy="5143500" type="screen4x3"/>
+  <p:sldSz cx="9144000" cy="5143500" type="screen16x9"/>
   <p:notesSz cx="6858000" cy="9144000"/>
   <p:defaultTextStyle>
     <a:defPPr>
@@ -119,7 +122,456 @@
       </a:defRPr>
     </a:lvl9pPr>
   </p:defaultTextStyle>
+  <p:extLst>
+    <p:ext uri="{EFAFB233-063F-42B5-8137-9DF3F51BA10A}">
+      <p15:sldGuideLst xmlns:p15="http://schemas.microsoft.com/office/powerpoint/2012/main">
+        <p15:guide id="1" orient="horz" pos="2160">
+          <p15:clr>
+            <a:srgbClr val="A4A3A4"/>
+          </p15:clr>
+        </p15:guide>
+        <p15:guide id="2" pos="2880">
+          <p15:clr>
+            <a:srgbClr val="A4A3A4"/>
+          </p15:clr>
+        </p15:guide>
+      </p15:sldGuideLst>
+    </p:ext>
+  </p:extLst>
 </p:presentation>
+</file>
+
+<file path=ppt/notesMasters/notesMaster1.xml><?xml version="1.0" encoding="utf-8"?>
+<p:notesMaster xmlns:a="http://schemas.openxmlformats.org/drawingml/2006/main" xmlns:r="http://schemas.openxmlformats.org/officeDocument/2006/relationships" xmlns:p="http://schemas.openxmlformats.org/presentationml/2006/main">
+  <p:cSld>
+    <p:bg>
+      <p:bgRef idx="1001">
+        <a:schemeClr val="bg1"/>
+      </p:bgRef>
+    </p:bg>
+    <p:spTree>
+      <p:nvGrpSpPr>
+        <p:cNvPr id="1" name=""/>
+        <p:cNvGrpSpPr/>
+        <p:nvPr/>
+      </p:nvGrpSpPr>
+      <p:grpSpPr>
+        <a:xfrm>
+          <a:off x="0" y="0"/>
+          <a:ext cx="0" cy="0"/>
+          <a:chOff x="0" y="0"/>
+          <a:chExt cx="0" cy="0"/>
+        </a:xfrm>
+      </p:grpSpPr>
+      <p:sp>
+        <p:nvSpPr>
+          <p:cNvPr id="2" name="Header Placeholder 1"/>
+          <p:cNvSpPr>
+            <a:spLocks noGrp="1"/>
+          </p:cNvSpPr>
+          <p:nvPr>
+            <p:ph type="hdr" sz="quarter"/>
+          </p:nvPr>
+        </p:nvSpPr>
+        <p:spPr>
+          <a:xfrm>
+            <a:off x="0" y="0"/>
+            <a:ext cx="2971800" cy="458788"/>
+          </a:xfrm>
+          <a:prstGeom prst="rect">
+            <a:avLst/>
+          </a:prstGeom>
+        </p:spPr>
+        <p:txBody>
+          <a:bodyPr vert="horz" lIns="91440" tIns="45720" rIns="91440" bIns="45720" rtlCol="0"/>
+          <a:lstStyle>
+            <a:lvl1pPr algn="l">
+              <a:defRPr sz="1200"/>
+            </a:lvl1pPr>
+          </a:lstStyle>
+          <a:p>
+            <a:endParaRPr lang="en-US"/>
+          </a:p>
+        </p:txBody>
+      </p:sp>
+      <p:sp>
+        <p:nvSpPr>
+          <p:cNvPr id="3" name="Date Placeholder 2"/>
+          <p:cNvSpPr>
+            <a:spLocks noGrp="1"/>
+          </p:cNvSpPr>
+          <p:nvPr>
+            <p:ph type="dt" idx="1"/>
+          </p:nvPr>
+        </p:nvSpPr>
+        <p:spPr>
+          <a:xfrm>
+            <a:off x="3884613" y="0"/>
+            <a:ext cx="2971800" cy="458788"/>
+          </a:xfrm>
+          <a:prstGeom prst="rect">
+            <a:avLst/>
+          </a:prstGeom>
+        </p:spPr>
+        <p:txBody>
+          <a:bodyPr vert="horz" lIns="91440" tIns="45720" rIns="91440" bIns="45720" rtlCol="0"/>
+          <a:lstStyle>
+            <a:lvl1pPr algn="r">
+              <a:defRPr sz="1200"/>
+            </a:lvl1pPr>
+          </a:lstStyle>
+          <a:p>
+            <a:fld id="{4712649C-2695-224D-8A08-BE377AF1C886}" type="datetimeFigureOut">
+              <a:rPr lang="en-US" smtClean="0"/>
+              <a:t>12/19/25</a:t>
+            </a:fld>
+            <a:endParaRPr lang="en-US"/>
+          </a:p>
+        </p:txBody>
+      </p:sp>
+      <p:sp>
+        <p:nvSpPr>
+          <p:cNvPr id="4" name="Slide Image Placeholder 3"/>
+          <p:cNvSpPr>
+            <a:spLocks noGrp="1" noRot="1" noChangeAspect="1"/>
+          </p:cNvSpPr>
+          <p:nvPr>
+            <p:ph type="sldImg" idx="2"/>
+          </p:nvPr>
+        </p:nvSpPr>
+        <p:spPr>
+          <a:xfrm>
+            <a:off x="685800" y="1143000"/>
+            <a:ext cx="5486400" cy="3086100"/>
+          </a:xfrm>
+          <a:prstGeom prst="rect">
+            <a:avLst/>
+          </a:prstGeom>
+          <a:noFill/>
+          <a:ln w="12700">
+            <a:solidFill>
+              <a:prstClr val="black"/>
+            </a:solidFill>
+          </a:ln>
+        </p:spPr>
+        <p:txBody>
+          <a:bodyPr vert="horz" lIns="91440" tIns="45720" rIns="91440" bIns="45720" rtlCol="0" anchor="ctr"/>
+          <a:lstStyle/>
+          <a:p>
+            <a:endParaRPr lang="en-US"/>
+          </a:p>
+        </p:txBody>
+      </p:sp>
+      <p:sp>
+        <p:nvSpPr>
+          <p:cNvPr id="5" name="Notes Placeholder 4"/>
+          <p:cNvSpPr>
+            <a:spLocks noGrp="1"/>
+          </p:cNvSpPr>
+          <p:nvPr>
+            <p:ph type="body" sz="quarter" idx="3"/>
+          </p:nvPr>
+        </p:nvSpPr>
+        <p:spPr>
+          <a:xfrm>
+            <a:off x="685800" y="4400550"/>
+            <a:ext cx="5486400" cy="3600450"/>
+          </a:xfrm>
+          <a:prstGeom prst="rect">
+            <a:avLst/>
+          </a:prstGeom>
+        </p:spPr>
+        <p:txBody>
+          <a:bodyPr vert="horz" lIns="91440" tIns="45720" rIns="91440" bIns="45720" rtlCol="0"/>
+          <a:lstStyle/>
+          <a:p>
+            <a:pPr lvl="0"/>
+            <a:r>
+              <a:rPr lang="en-US"/>
+              <a:t>Click to edit Master text styles</a:t>
+            </a:r>
+          </a:p>
+          <a:p>
+            <a:pPr lvl="1"/>
+            <a:r>
+              <a:rPr lang="en-US"/>
+              <a:t>Second level</a:t>
+            </a:r>
+          </a:p>
+          <a:p>
+            <a:pPr lvl="2"/>
+            <a:r>
+              <a:rPr lang="en-US"/>
+              <a:t>Third level</a:t>
+            </a:r>
+          </a:p>
+          <a:p>
+            <a:pPr lvl="3"/>
+            <a:r>
+              <a:rPr lang="en-US"/>
+              <a:t>Fourth level</a:t>
+            </a:r>
+          </a:p>
+          <a:p>
+            <a:pPr lvl="4"/>
+            <a:r>
+              <a:rPr lang="en-US"/>
+              <a:t>Fifth level</a:t>
+            </a:r>
+          </a:p>
+        </p:txBody>
+      </p:sp>
+      <p:sp>
+        <p:nvSpPr>
+          <p:cNvPr id="6" name="Footer Placeholder 5"/>
+          <p:cNvSpPr>
+            <a:spLocks noGrp="1"/>
+          </p:cNvSpPr>
+          <p:nvPr>
+            <p:ph type="ftr" sz="quarter" idx="4"/>
+          </p:nvPr>
+        </p:nvSpPr>
+        <p:spPr>
+          <a:xfrm>
+            <a:off x="0" y="8685213"/>
+            <a:ext cx="2971800" cy="458787"/>
+          </a:xfrm>
+          <a:prstGeom prst="rect">
+            <a:avLst/>
+          </a:prstGeom>
+        </p:spPr>
+        <p:txBody>
+          <a:bodyPr vert="horz" lIns="91440" tIns="45720" rIns="91440" bIns="45720" rtlCol="0" anchor="b"/>
+          <a:lstStyle>
+            <a:lvl1pPr algn="l">
+              <a:defRPr sz="1200"/>
+            </a:lvl1pPr>
+          </a:lstStyle>
+          <a:p>
+            <a:endParaRPr lang="en-US"/>
+          </a:p>
+        </p:txBody>
+      </p:sp>
+      <p:sp>
+        <p:nvSpPr>
+          <p:cNvPr id="7" name="Slide Number Placeholder 6"/>
+          <p:cNvSpPr>
+            <a:spLocks noGrp="1"/>
+          </p:cNvSpPr>
+          <p:nvPr>
+            <p:ph type="sldNum" sz="quarter" idx="5"/>
+          </p:nvPr>
+        </p:nvSpPr>
+        <p:spPr>
+          <a:xfrm>
+            <a:off x="3884613" y="8685213"/>
+            <a:ext cx="2971800" cy="458787"/>
+          </a:xfrm>
+          <a:prstGeom prst="rect">
+            <a:avLst/>
+          </a:prstGeom>
+        </p:spPr>
+        <p:txBody>
+          <a:bodyPr vert="horz" lIns="91440" tIns="45720" rIns="91440" bIns="45720" rtlCol="0" anchor="b"/>
+          <a:lstStyle>
+            <a:lvl1pPr algn="r">
+              <a:defRPr sz="1200"/>
+            </a:lvl1pPr>
+          </a:lstStyle>
+          <a:p>
+            <a:fld id="{03DDB13D-210E-AC4F-BD06-DE238DB90195}" type="slidenum">
+              <a:rPr lang="en-US" smtClean="0"/>
+              <a:t>‹#›</a:t>
+            </a:fld>
+            <a:endParaRPr lang="en-US"/>
+          </a:p>
+        </p:txBody>
+      </p:sp>
+    </p:spTree>
+    <p:extLst>
+      <p:ext uri="{BB962C8B-B14F-4D97-AF65-F5344CB8AC3E}">
+        <p14:creationId xmlns:p14="http://schemas.microsoft.com/office/powerpoint/2010/main" val="3367749446"/>
+      </p:ext>
+    </p:extLst>
+  </p:cSld>
+  <p:clrMap bg1="lt1" tx1="dk1" bg2="lt2" tx2="dk2" accent1="accent1" accent2="accent2" accent3="accent3" accent4="accent4" accent5="accent5" accent6="accent6" hlink="hlink" folHlink="folHlink"/>
+  <p:notesStyle>
+    <a:lvl1pPr marL="0" algn="l" defTabSz="914400" rtl="0" eaLnBrk="1" latinLnBrk="0" hangingPunct="1">
+      <a:defRPr sz="1200" kern="1200">
+        <a:solidFill>
+          <a:schemeClr val="tx1"/>
+        </a:solidFill>
+        <a:latin typeface="+mn-lt"/>
+        <a:ea typeface="+mn-ea"/>
+        <a:cs typeface="+mn-cs"/>
+      </a:defRPr>
+    </a:lvl1pPr>
+    <a:lvl2pPr marL="457200" algn="l" defTabSz="914400" rtl="0" eaLnBrk="1" latinLnBrk="0" hangingPunct="1">
+      <a:defRPr sz="1200" kern="1200">
+        <a:solidFill>
+          <a:schemeClr val="tx1"/>
+        </a:solidFill>
+        <a:latin typeface="+mn-lt"/>
+        <a:ea typeface="+mn-ea"/>
+        <a:cs typeface="+mn-cs"/>
+      </a:defRPr>
+    </a:lvl2pPr>
+    <a:lvl3pPr marL="914400" algn="l" defTabSz="914400" rtl="0" eaLnBrk="1" latinLnBrk="0" hangingPunct="1">
+      <a:defRPr sz="1200" kern="1200">
+        <a:solidFill>
+          <a:schemeClr val="tx1"/>
+        </a:solidFill>
+        <a:latin typeface="+mn-lt"/>
+        <a:ea typeface="+mn-ea"/>
+        <a:cs typeface="+mn-cs"/>
+      </a:defRPr>
+    </a:lvl3pPr>
+    <a:lvl4pPr marL="1371600" algn="l" defTabSz="914400" rtl="0" eaLnBrk="1" latinLnBrk="0" hangingPunct="1">
+      <a:defRPr sz="1200" kern="1200">
+        <a:solidFill>
+          <a:schemeClr val="tx1"/>
+        </a:solidFill>
+        <a:latin typeface="+mn-lt"/>
+        <a:ea typeface="+mn-ea"/>
+        <a:cs typeface="+mn-cs"/>
+      </a:defRPr>
+    </a:lvl4pPr>
+    <a:lvl5pPr marL="1828800" algn="l" defTabSz="914400" rtl="0" eaLnBrk="1" latinLnBrk="0" hangingPunct="1">
+      <a:defRPr sz="1200" kern="1200">
+        <a:solidFill>
+          <a:schemeClr val="tx1"/>
+        </a:solidFill>
+        <a:latin typeface="+mn-lt"/>
+        <a:ea typeface="+mn-ea"/>
+        <a:cs typeface="+mn-cs"/>
+      </a:defRPr>
+    </a:lvl5pPr>
+    <a:lvl6pPr marL="2286000" algn="l" defTabSz="914400" rtl="0" eaLnBrk="1" latinLnBrk="0" hangingPunct="1">
+      <a:defRPr sz="1200" kern="1200">
+        <a:solidFill>
+          <a:schemeClr val="tx1"/>
+        </a:solidFill>
+        <a:latin typeface="+mn-lt"/>
+        <a:ea typeface="+mn-ea"/>
+        <a:cs typeface="+mn-cs"/>
+      </a:defRPr>
+    </a:lvl6pPr>
+    <a:lvl7pPr marL="2743200" algn="l" defTabSz="914400" rtl="0" eaLnBrk="1" latinLnBrk="0" hangingPunct="1">
+      <a:defRPr sz="1200" kern="1200">
+        <a:solidFill>
+          <a:schemeClr val="tx1"/>
+        </a:solidFill>
+        <a:latin typeface="+mn-lt"/>
+        <a:ea typeface="+mn-ea"/>
+        <a:cs typeface="+mn-cs"/>
+      </a:defRPr>
+    </a:lvl7pPr>
+    <a:lvl8pPr marL="3200400" algn="l" defTabSz="914400" rtl="0" eaLnBrk="1" latinLnBrk="0" hangingPunct="1">
+      <a:defRPr sz="1200" kern="1200">
+        <a:solidFill>
+          <a:schemeClr val="tx1"/>
+        </a:solidFill>
+        <a:latin typeface="+mn-lt"/>
+        <a:ea typeface="+mn-ea"/>
+        <a:cs typeface="+mn-cs"/>
+      </a:defRPr>
+    </a:lvl8pPr>
+    <a:lvl9pPr marL="3657600" algn="l" defTabSz="914400" rtl="0" eaLnBrk="1" latinLnBrk="0" hangingPunct="1">
+      <a:defRPr sz="1200" kern="1200">
+        <a:solidFill>
+          <a:schemeClr val="tx1"/>
+        </a:solidFill>
+        <a:latin typeface="+mn-lt"/>
+        <a:ea typeface="+mn-ea"/>
+        <a:cs typeface="+mn-cs"/>
+      </a:defRPr>
+    </a:lvl9pPr>
+  </p:notesStyle>
+</p:notesMaster>
+</file>
+
+<file path=ppt/notesSlides/notesSlide1.xml><?xml version="1.0" encoding="utf-8"?>
+<p:notes xmlns:a="http://schemas.openxmlformats.org/drawingml/2006/main" xmlns:r="http://schemas.openxmlformats.org/officeDocument/2006/relationships" xmlns:p="http://schemas.openxmlformats.org/presentationml/2006/main">
+  <p:cSld>
+    <p:spTree>
+      <p:nvGrpSpPr>
+        <p:cNvPr id="1" name=""/>
+        <p:cNvGrpSpPr/>
+        <p:nvPr/>
+      </p:nvGrpSpPr>
+      <p:grpSpPr>
+        <a:xfrm>
+          <a:off x="0" y="0"/>
+          <a:ext cx="0" cy="0"/>
+          <a:chOff x="0" y="0"/>
+          <a:chExt cx="0" cy="0"/>
+        </a:xfrm>
+      </p:grpSpPr>
+      <p:sp>
+        <p:nvSpPr>
+          <p:cNvPr id="2" name="Slide Image Placeholder 1"/>
+          <p:cNvSpPr>
+            <a:spLocks noGrp="1" noRot="1" noChangeAspect="1"/>
+          </p:cNvSpPr>
+          <p:nvPr>
+            <p:ph type="sldImg"/>
+          </p:nvPr>
+        </p:nvSpPr>
+        <p:spPr/>
+      </p:sp>
+      <p:sp>
+        <p:nvSpPr>
+          <p:cNvPr id="3" name="Notes Placeholder 2"/>
+          <p:cNvSpPr>
+            <a:spLocks noGrp="1"/>
+          </p:cNvSpPr>
+          <p:nvPr>
+            <p:ph type="body" idx="1"/>
+          </p:nvPr>
+        </p:nvSpPr>
+        <p:spPr/>
+        <p:txBody>
+          <a:bodyPr/>
+          <a:lstStyle/>
+          <a:p>
+            <a:endParaRPr lang="en-US" dirty="0"/>
+          </a:p>
+        </p:txBody>
+      </p:sp>
+      <p:sp>
+        <p:nvSpPr>
+          <p:cNvPr id="4" name="Slide Number Placeholder 3"/>
+          <p:cNvSpPr>
+            <a:spLocks noGrp="1"/>
+          </p:cNvSpPr>
+          <p:nvPr>
+            <p:ph type="sldNum" sz="quarter" idx="5"/>
+          </p:nvPr>
+        </p:nvSpPr>
+        <p:spPr/>
+        <p:txBody>
+          <a:bodyPr/>
+          <a:lstStyle/>
+          <a:p>
+            <a:fld id="{03DDB13D-210E-AC4F-BD06-DE238DB90195}" type="slidenum">
+              <a:rPr lang="en-US" smtClean="0"/>
+              <a:t>14</a:t>
+            </a:fld>
+            <a:endParaRPr lang="en-US"/>
+          </a:p>
+        </p:txBody>
+      </p:sp>
+    </p:spTree>
+    <p:extLst>
+      <p:ext uri="{BB962C8B-B14F-4D97-AF65-F5344CB8AC3E}">
+        <p14:creationId xmlns:p14="http://schemas.microsoft.com/office/powerpoint/2010/main" val="1252680180"/>
+      </p:ext>
+    </p:extLst>
+  </p:cSld>
+  <p:clrMapOvr>
+    <a:masterClrMapping/>
+  </p:clrMapOvr>
+</p:notes>
 </file>
 
 <file path=ppt/slideLayouts/slideLayout1.xml><?xml version="1.0" encoding="utf-8"?>
@@ -160,10 +612,9 @@
           <a:lstStyle/>
           <a:p>
             <a:r>
-              <a:rPr lang="en-US" smtClean="0"/>
+              <a:rPr lang="en-US"/>
               <a:t>Click to edit Master title style</a:t>
             </a:r>
-            <a:endParaRPr lang="en-US"/>
           </a:p>
         </p:txBody>
       </p:sp>
@@ -279,10 +730,9 @@
           </a:lstStyle>
           <a:p>
             <a:r>
-              <a:rPr lang="en-US" smtClean="0"/>
+              <a:rPr lang="en-US"/>
               <a:t>Click to edit Master subtitle style</a:t>
             </a:r>
-            <a:endParaRPr lang="en-US"/>
           </a:p>
         </p:txBody>
       </p:sp>
@@ -303,7 +753,7 @@
           <a:p>
             <a:fld id="{5BCAD085-E8A6-8845-BD4E-CB4CCA059FC4}" type="datetimeFigureOut">
               <a:rPr lang="en-US" smtClean="0"/>
-              <a:t>1/27/13</a:t>
+              <a:t>12/19/25</a:t>
             </a:fld>
             <a:endParaRPr lang="en-US"/>
           </a:p>
@@ -397,10 +847,9 @@
           <a:lstStyle/>
           <a:p>
             <a:r>
-              <a:rPr lang="en-US" smtClean="0"/>
+              <a:rPr lang="en-US"/>
               <a:t>Click to edit Master title style</a:t>
             </a:r>
-            <a:endParaRPr lang="en-US"/>
           </a:p>
         </p:txBody>
       </p:sp>
@@ -421,38 +870,37 @@
           <a:p>
             <a:pPr lvl="0"/>
             <a:r>
-              <a:rPr lang="en-US" smtClean="0"/>
+              <a:rPr lang="en-US"/>
               <a:t>Click to edit Master text styles</a:t>
             </a:r>
           </a:p>
           <a:p>
             <a:pPr lvl="1"/>
             <a:r>
-              <a:rPr lang="en-US" smtClean="0"/>
+              <a:rPr lang="en-US"/>
               <a:t>Second level</a:t>
             </a:r>
           </a:p>
           <a:p>
             <a:pPr lvl="2"/>
             <a:r>
-              <a:rPr lang="en-US" smtClean="0"/>
+              <a:rPr lang="en-US"/>
               <a:t>Third level</a:t>
             </a:r>
           </a:p>
           <a:p>
             <a:pPr lvl="3"/>
             <a:r>
-              <a:rPr lang="en-US" smtClean="0"/>
+              <a:rPr lang="en-US"/>
               <a:t>Fourth level</a:t>
             </a:r>
           </a:p>
           <a:p>
             <a:pPr lvl="4"/>
             <a:r>
-              <a:rPr lang="en-US" smtClean="0"/>
+              <a:rPr lang="en-US"/>
               <a:t>Fifth level</a:t>
             </a:r>
-            <a:endParaRPr lang="en-US"/>
           </a:p>
         </p:txBody>
       </p:sp>
@@ -473,7 +921,7 @@
           <a:p>
             <a:fld id="{5BCAD085-E8A6-8845-BD4E-CB4CCA059FC4}" type="datetimeFigureOut">
               <a:rPr lang="en-US" smtClean="0"/>
-              <a:t>1/27/13</a:t>
+              <a:t>12/19/25</a:t>
             </a:fld>
             <a:endParaRPr lang="en-US"/>
           </a:p>
@@ -572,10 +1020,9 @@
           <a:lstStyle/>
           <a:p>
             <a:r>
-              <a:rPr lang="en-US" smtClean="0"/>
+              <a:rPr lang="en-US"/>
               <a:t>Click to edit Master title style</a:t>
             </a:r>
-            <a:endParaRPr lang="en-US"/>
           </a:p>
         </p:txBody>
       </p:sp>
@@ -601,38 +1048,37 @@
           <a:p>
             <a:pPr lvl="0"/>
             <a:r>
-              <a:rPr lang="en-US" smtClean="0"/>
+              <a:rPr lang="en-US"/>
               <a:t>Click to edit Master text styles</a:t>
             </a:r>
           </a:p>
           <a:p>
             <a:pPr lvl="1"/>
             <a:r>
-              <a:rPr lang="en-US" smtClean="0"/>
+              <a:rPr lang="en-US"/>
               <a:t>Second level</a:t>
             </a:r>
           </a:p>
           <a:p>
             <a:pPr lvl="2"/>
             <a:r>
-              <a:rPr lang="en-US" smtClean="0"/>
+              <a:rPr lang="en-US"/>
               <a:t>Third level</a:t>
             </a:r>
           </a:p>
           <a:p>
             <a:pPr lvl="3"/>
             <a:r>
-              <a:rPr lang="en-US" smtClean="0"/>
+              <a:rPr lang="en-US"/>
               <a:t>Fourth level</a:t>
             </a:r>
           </a:p>
           <a:p>
             <a:pPr lvl="4"/>
             <a:r>
-              <a:rPr lang="en-US" smtClean="0"/>
+              <a:rPr lang="en-US"/>
               <a:t>Fifth level</a:t>
             </a:r>
-            <a:endParaRPr lang="en-US"/>
           </a:p>
         </p:txBody>
       </p:sp>
@@ -653,7 +1099,7 @@
           <a:p>
             <a:fld id="{5BCAD085-E8A6-8845-BD4E-CB4CCA059FC4}" type="datetimeFigureOut">
               <a:rPr lang="en-US" smtClean="0"/>
-              <a:t>1/27/13</a:t>
+              <a:t>12/19/25</a:t>
             </a:fld>
             <a:endParaRPr lang="en-US"/>
           </a:p>
@@ -747,10 +1193,9 @@
           <a:lstStyle/>
           <a:p>
             <a:r>
-              <a:rPr lang="en-US" smtClean="0"/>
+              <a:rPr lang="en-US"/>
               <a:t>Click to edit Master title style</a:t>
             </a:r>
-            <a:endParaRPr lang="en-US"/>
           </a:p>
         </p:txBody>
       </p:sp>
@@ -771,38 +1216,37 @@
           <a:p>
             <a:pPr lvl="0"/>
             <a:r>
-              <a:rPr lang="en-US" smtClean="0"/>
+              <a:rPr lang="en-US"/>
               <a:t>Click to edit Master text styles</a:t>
             </a:r>
           </a:p>
           <a:p>
             <a:pPr lvl="1"/>
             <a:r>
-              <a:rPr lang="en-US" smtClean="0"/>
+              <a:rPr lang="en-US"/>
               <a:t>Second level</a:t>
             </a:r>
           </a:p>
           <a:p>
             <a:pPr lvl="2"/>
             <a:r>
-              <a:rPr lang="en-US" smtClean="0"/>
+              <a:rPr lang="en-US"/>
               <a:t>Third level</a:t>
             </a:r>
           </a:p>
           <a:p>
             <a:pPr lvl="3"/>
             <a:r>
-              <a:rPr lang="en-US" smtClean="0"/>
+              <a:rPr lang="en-US"/>
               <a:t>Fourth level</a:t>
             </a:r>
           </a:p>
           <a:p>
             <a:pPr lvl="4"/>
             <a:r>
-              <a:rPr lang="en-US" smtClean="0"/>
+              <a:rPr lang="en-US"/>
               <a:t>Fifth level</a:t>
             </a:r>
-            <a:endParaRPr lang="en-US"/>
           </a:p>
         </p:txBody>
       </p:sp>
@@ -823,7 +1267,7 @@
           <a:p>
             <a:fld id="{5BCAD085-E8A6-8845-BD4E-CB4CCA059FC4}" type="datetimeFigureOut">
               <a:rPr lang="en-US" smtClean="0"/>
-              <a:t>1/27/13</a:t>
+              <a:t>12/19/25</a:t>
             </a:fld>
             <a:endParaRPr lang="en-US"/>
           </a:p>
@@ -926,10 +1370,9 @@
           </a:lstStyle>
           <a:p>
             <a:r>
-              <a:rPr lang="en-US" smtClean="0"/>
+              <a:rPr lang="en-US"/>
               <a:t>Click to edit Master title style</a:t>
             </a:r>
-            <a:endParaRPr lang="en-US"/>
           </a:p>
         </p:txBody>
       </p:sp>
@@ -1046,7 +1489,7 @@
           <a:p>
             <a:pPr lvl="0"/>
             <a:r>
-              <a:rPr lang="en-US" smtClean="0"/>
+              <a:rPr lang="en-US"/>
               <a:t>Click to edit Master text styles</a:t>
             </a:r>
           </a:p>
@@ -1069,7 +1512,7 @@
           <a:p>
             <a:fld id="{5BCAD085-E8A6-8845-BD4E-CB4CCA059FC4}" type="datetimeFigureOut">
               <a:rPr lang="en-US" smtClean="0"/>
-              <a:t>1/27/13</a:t>
+              <a:t>12/19/25</a:t>
             </a:fld>
             <a:endParaRPr lang="en-US"/>
           </a:p>
@@ -1163,10 +1606,9 @@
           <a:lstStyle/>
           <a:p>
             <a:r>
-              <a:rPr lang="en-US" smtClean="0"/>
+              <a:rPr lang="en-US"/>
               <a:t>Click to edit Master title style</a:t>
             </a:r>
-            <a:endParaRPr lang="en-US"/>
           </a:p>
         </p:txBody>
       </p:sp>
@@ -1220,38 +1662,37 @@
           <a:p>
             <a:pPr lvl="0"/>
             <a:r>
-              <a:rPr lang="en-US" smtClean="0"/>
+              <a:rPr lang="en-US"/>
               <a:t>Click to edit Master text styles</a:t>
             </a:r>
           </a:p>
           <a:p>
             <a:pPr lvl="1"/>
             <a:r>
-              <a:rPr lang="en-US" smtClean="0"/>
+              <a:rPr lang="en-US"/>
               <a:t>Second level</a:t>
             </a:r>
           </a:p>
           <a:p>
             <a:pPr lvl="2"/>
             <a:r>
-              <a:rPr lang="en-US" smtClean="0"/>
+              <a:rPr lang="en-US"/>
               <a:t>Third level</a:t>
             </a:r>
           </a:p>
           <a:p>
             <a:pPr lvl="3"/>
             <a:r>
-              <a:rPr lang="en-US" smtClean="0"/>
+              <a:rPr lang="en-US"/>
               <a:t>Fourth level</a:t>
             </a:r>
           </a:p>
           <a:p>
             <a:pPr lvl="4"/>
             <a:r>
-              <a:rPr lang="en-US" smtClean="0"/>
+              <a:rPr lang="en-US"/>
               <a:t>Fifth level</a:t>
             </a:r>
-            <a:endParaRPr lang="en-US"/>
           </a:p>
         </p:txBody>
       </p:sp>
@@ -1305,38 +1746,37 @@
           <a:p>
             <a:pPr lvl="0"/>
             <a:r>
-              <a:rPr lang="en-US" smtClean="0"/>
+              <a:rPr lang="en-US"/>
               <a:t>Click to edit Master text styles</a:t>
             </a:r>
           </a:p>
           <a:p>
             <a:pPr lvl="1"/>
             <a:r>
-              <a:rPr lang="en-US" smtClean="0"/>
+              <a:rPr lang="en-US"/>
               <a:t>Second level</a:t>
             </a:r>
           </a:p>
           <a:p>
             <a:pPr lvl="2"/>
             <a:r>
-              <a:rPr lang="en-US" smtClean="0"/>
+              <a:rPr lang="en-US"/>
               <a:t>Third level</a:t>
             </a:r>
           </a:p>
           <a:p>
             <a:pPr lvl="3"/>
             <a:r>
-              <a:rPr lang="en-US" smtClean="0"/>
+              <a:rPr lang="en-US"/>
               <a:t>Fourth level</a:t>
             </a:r>
           </a:p>
           <a:p>
             <a:pPr lvl="4"/>
             <a:r>
-              <a:rPr lang="en-US" smtClean="0"/>
+              <a:rPr lang="en-US"/>
               <a:t>Fifth level</a:t>
             </a:r>
-            <a:endParaRPr lang="en-US"/>
           </a:p>
         </p:txBody>
       </p:sp>
@@ -1357,7 +1797,7 @@
           <a:p>
             <a:fld id="{5BCAD085-E8A6-8845-BD4E-CB4CCA059FC4}" type="datetimeFigureOut">
               <a:rPr lang="en-US" smtClean="0"/>
-              <a:t>1/27/13</a:t>
+              <a:t>12/19/25</a:t>
             </a:fld>
             <a:endParaRPr lang="en-US"/>
           </a:p>
@@ -1455,10 +1895,9 @@
           </a:lstStyle>
           <a:p>
             <a:r>
-              <a:rPr lang="en-US" smtClean="0"/>
+              <a:rPr lang="en-US"/>
               <a:t>Click to edit Master title style</a:t>
             </a:r>
-            <a:endParaRPr lang="en-US"/>
           </a:p>
         </p:txBody>
       </p:sp>
@@ -1521,7 +1960,7 @@
           <a:p>
             <a:pPr lvl="0"/>
             <a:r>
-              <a:rPr lang="en-US" smtClean="0"/>
+              <a:rPr lang="en-US"/>
               <a:t>Click to edit Master text styles</a:t>
             </a:r>
           </a:p>
@@ -1577,38 +2016,37 @@
           <a:p>
             <a:pPr lvl="0"/>
             <a:r>
-              <a:rPr lang="en-US" smtClean="0"/>
+              <a:rPr lang="en-US"/>
               <a:t>Click to edit Master text styles</a:t>
             </a:r>
           </a:p>
           <a:p>
             <a:pPr lvl="1"/>
             <a:r>
-              <a:rPr lang="en-US" smtClean="0"/>
+              <a:rPr lang="en-US"/>
               <a:t>Second level</a:t>
             </a:r>
           </a:p>
           <a:p>
             <a:pPr lvl="2"/>
             <a:r>
-              <a:rPr lang="en-US" smtClean="0"/>
+              <a:rPr lang="en-US"/>
               <a:t>Third level</a:t>
             </a:r>
           </a:p>
           <a:p>
             <a:pPr lvl="3"/>
             <a:r>
-              <a:rPr lang="en-US" smtClean="0"/>
+              <a:rPr lang="en-US"/>
               <a:t>Fourth level</a:t>
             </a:r>
           </a:p>
           <a:p>
             <a:pPr lvl="4"/>
             <a:r>
-              <a:rPr lang="en-US" smtClean="0"/>
+              <a:rPr lang="en-US"/>
               <a:t>Fifth level</a:t>
             </a:r>
-            <a:endParaRPr lang="en-US"/>
           </a:p>
         </p:txBody>
       </p:sp>
@@ -1671,7 +2109,7 @@
           <a:p>
             <a:pPr lvl="0"/>
             <a:r>
-              <a:rPr lang="en-US" smtClean="0"/>
+              <a:rPr lang="en-US"/>
               <a:t>Click to edit Master text styles</a:t>
             </a:r>
           </a:p>
@@ -1727,38 +2165,37 @@
           <a:p>
             <a:pPr lvl="0"/>
             <a:r>
-              <a:rPr lang="en-US" smtClean="0"/>
+              <a:rPr lang="en-US"/>
               <a:t>Click to edit Master text styles</a:t>
             </a:r>
           </a:p>
           <a:p>
             <a:pPr lvl="1"/>
             <a:r>
-              <a:rPr lang="en-US" smtClean="0"/>
+              <a:rPr lang="en-US"/>
               <a:t>Second level</a:t>
             </a:r>
           </a:p>
           <a:p>
             <a:pPr lvl="2"/>
             <a:r>
-              <a:rPr lang="en-US" smtClean="0"/>
+              <a:rPr lang="en-US"/>
               <a:t>Third level</a:t>
             </a:r>
           </a:p>
           <a:p>
             <a:pPr lvl="3"/>
             <a:r>
-              <a:rPr lang="en-US" smtClean="0"/>
+              <a:rPr lang="en-US"/>
               <a:t>Fourth level</a:t>
             </a:r>
           </a:p>
           <a:p>
             <a:pPr lvl="4"/>
             <a:r>
-              <a:rPr lang="en-US" smtClean="0"/>
+              <a:rPr lang="en-US"/>
               <a:t>Fifth level</a:t>
             </a:r>
-            <a:endParaRPr lang="en-US"/>
           </a:p>
         </p:txBody>
       </p:sp>
@@ -1779,7 +2216,7 @@
           <a:p>
             <a:fld id="{5BCAD085-E8A6-8845-BD4E-CB4CCA059FC4}" type="datetimeFigureOut">
               <a:rPr lang="en-US" smtClean="0"/>
-              <a:t>1/27/13</a:t>
+              <a:t>12/19/25</a:t>
             </a:fld>
             <a:endParaRPr lang="en-US"/>
           </a:p>
@@ -1873,10 +2310,9 @@
           <a:lstStyle/>
           <a:p>
             <a:r>
-              <a:rPr lang="en-US" smtClean="0"/>
+              <a:rPr lang="en-US"/>
               <a:t>Click to edit Master title style</a:t>
             </a:r>
-            <a:endParaRPr lang="en-US"/>
           </a:p>
         </p:txBody>
       </p:sp>
@@ -1897,7 +2333,7 @@
           <a:p>
             <a:fld id="{5BCAD085-E8A6-8845-BD4E-CB4CCA059FC4}" type="datetimeFigureOut">
               <a:rPr lang="en-US" smtClean="0"/>
-              <a:t>1/27/13</a:t>
+              <a:t>12/19/25</a:t>
             </a:fld>
             <a:endParaRPr lang="en-US"/>
           </a:p>
@@ -1992,7 +2428,7 @@
           <a:p>
             <a:fld id="{5BCAD085-E8A6-8845-BD4E-CB4CCA059FC4}" type="datetimeFigureOut">
               <a:rPr lang="en-US" smtClean="0"/>
-              <a:t>1/27/13</a:t>
+              <a:t>12/19/25</a:t>
             </a:fld>
             <a:endParaRPr lang="en-US"/>
           </a:p>
@@ -2095,10 +2531,9 @@
           </a:lstStyle>
           <a:p>
             <a:r>
-              <a:rPr lang="en-US" smtClean="0"/>
+              <a:rPr lang="en-US"/>
               <a:t>Click to edit Master title style</a:t>
             </a:r>
-            <a:endParaRPr lang="en-US"/>
           </a:p>
         </p:txBody>
       </p:sp>
@@ -2152,38 +2587,37 @@
           <a:p>
             <a:pPr lvl="0"/>
             <a:r>
-              <a:rPr lang="en-US" smtClean="0"/>
+              <a:rPr lang="en-US"/>
               <a:t>Click to edit Master text styles</a:t>
             </a:r>
           </a:p>
           <a:p>
             <a:pPr lvl="1"/>
             <a:r>
-              <a:rPr lang="en-US" smtClean="0"/>
+              <a:rPr lang="en-US"/>
               <a:t>Second level</a:t>
             </a:r>
           </a:p>
           <a:p>
             <a:pPr lvl="2"/>
             <a:r>
-              <a:rPr lang="en-US" smtClean="0"/>
+              <a:rPr lang="en-US"/>
               <a:t>Third level</a:t>
             </a:r>
           </a:p>
           <a:p>
             <a:pPr lvl="3"/>
             <a:r>
-              <a:rPr lang="en-US" smtClean="0"/>
+              <a:rPr lang="en-US"/>
               <a:t>Fourth level</a:t>
             </a:r>
           </a:p>
           <a:p>
             <a:pPr lvl="4"/>
             <a:r>
-              <a:rPr lang="en-US" smtClean="0"/>
+              <a:rPr lang="en-US"/>
               <a:t>Fifth level</a:t>
             </a:r>
-            <a:endParaRPr lang="en-US"/>
           </a:p>
         </p:txBody>
       </p:sp>
@@ -2246,7 +2680,7 @@
           <a:p>
             <a:pPr lvl="0"/>
             <a:r>
-              <a:rPr lang="en-US" smtClean="0"/>
+              <a:rPr lang="en-US"/>
               <a:t>Click to edit Master text styles</a:t>
             </a:r>
           </a:p>
@@ -2269,7 +2703,7 @@
           <a:p>
             <a:fld id="{5BCAD085-E8A6-8845-BD4E-CB4CCA059FC4}" type="datetimeFigureOut">
               <a:rPr lang="en-US" smtClean="0"/>
-              <a:t>1/27/13</a:t>
+              <a:t>12/19/25</a:t>
             </a:fld>
             <a:endParaRPr lang="en-US"/>
           </a:p>
@@ -2372,10 +2806,9 @@
           </a:lstStyle>
           <a:p>
             <a:r>
-              <a:rPr lang="en-US" smtClean="0"/>
+              <a:rPr lang="en-US"/>
               <a:t>Click to edit Master title style</a:t>
             </a:r>
-            <a:endParaRPr lang="en-US"/>
           </a:p>
         </p:txBody>
       </p:sp>
@@ -2499,7 +2932,7 @@
           <a:p>
             <a:pPr lvl="0"/>
             <a:r>
-              <a:rPr lang="en-US" smtClean="0"/>
+              <a:rPr lang="en-US"/>
               <a:t>Click to edit Master text styles</a:t>
             </a:r>
           </a:p>
@@ -2522,7 +2955,7 @@
           <a:p>
             <a:fld id="{5BCAD085-E8A6-8845-BD4E-CB4CCA059FC4}" type="datetimeFigureOut">
               <a:rPr lang="en-US" smtClean="0"/>
-              <a:t>1/27/13</a:t>
+              <a:t>12/19/25</a:t>
             </a:fld>
             <a:endParaRPr lang="en-US"/>
           </a:p>
@@ -2634,10 +3067,9 @@
           <a:lstStyle/>
           <a:p>
             <a:r>
-              <a:rPr lang="en-US" smtClean="0"/>
+              <a:rPr lang="en-US"/>
               <a:t>Click to edit Master title style</a:t>
             </a:r>
-            <a:endParaRPr lang="en-US"/>
           </a:p>
         </p:txBody>
       </p:sp>
@@ -2668,38 +3100,37 @@
           <a:p>
             <a:pPr lvl="0"/>
             <a:r>
-              <a:rPr lang="en-US" smtClean="0"/>
+              <a:rPr lang="en-US"/>
               <a:t>Click to edit Master text styles</a:t>
             </a:r>
           </a:p>
           <a:p>
             <a:pPr lvl="1"/>
             <a:r>
-              <a:rPr lang="en-US" smtClean="0"/>
+              <a:rPr lang="en-US"/>
               <a:t>Second level</a:t>
             </a:r>
           </a:p>
           <a:p>
             <a:pPr lvl="2"/>
             <a:r>
-              <a:rPr lang="en-US" smtClean="0"/>
+              <a:rPr lang="en-US"/>
               <a:t>Third level</a:t>
             </a:r>
           </a:p>
           <a:p>
             <a:pPr lvl="3"/>
             <a:r>
-              <a:rPr lang="en-US" smtClean="0"/>
+              <a:rPr lang="en-US"/>
               <a:t>Fourth level</a:t>
             </a:r>
           </a:p>
           <a:p>
             <a:pPr lvl="4"/>
             <a:r>
-              <a:rPr lang="en-US" smtClean="0"/>
+              <a:rPr lang="en-US"/>
               <a:t>Fifth level</a:t>
             </a:r>
-            <a:endParaRPr lang="en-US"/>
           </a:p>
         </p:txBody>
       </p:sp>
@@ -2738,7 +3169,7 @@
           <a:p>
             <a:fld id="{5BCAD085-E8A6-8845-BD4E-CB4CCA059FC4}" type="datetimeFigureOut">
               <a:rPr lang="en-US" smtClean="0"/>
-              <a:t>1/27/13</a:t>
+              <a:t>12/19/25</a:t>
             </a:fld>
             <a:endParaRPr lang="en-US"/>
           </a:p>
@@ -2822,6 +3253,36 @@
           </a:p>
         </p:txBody>
       </p:sp>
+      <p:pic>
+        <p:nvPicPr>
+          <p:cNvPr id="7" name="Picture 6" descr="A blue and black logo&#10;&#10;AI-generated content may be incorrect.">
+            <a:extLst>
+              <a:ext uri="{FF2B5EF4-FFF2-40B4-BE49-F238E27FC236}">
+                <a16:creationId xmlns:a16="http://schemas.microsoft.com/office/drawing/2014/main" id="{8E0783BB-A526-E332-2210-59762901DFFE}"/>
+              </a:ext>
+            </a:extLst>
+          </p:cNvPr>
+          <p:cNvPicPr>
+            <a:picLocks noChangeAspect="1"/>
+          </p:cNvPicPr>
+          <p:nvPr userDrawn="1"/>
+        </p:nvPicPr>
+        <p:blipFill>
+          <a:blip r:embed="rId13"/>
+          <a:stretch>
+            <a:fillRect/>
+          </a:stretch>
+        </p:blipFill>
+        <p:spPr>
+          <a:xfrm>
+            <a:off x="8357653" y="759345"/>
+            <a:ext cx="658293" cy="658293"/>
+          </a:xfrm>
+          <a:prstGeom prst="rect">
+            <a:avLst/>
+          </a:prstGeom>
+        </p:spPr>
+      </p:pic>
     </p:spTree>
     <p:extLst>
       <p:ext uri="{BB962C8B-B14F-4D97-AF65-F5344CB8AC3E}">
@@ -3097,7 +3558,7 @@
 </file>
 
 <file path=ppt/slides/slide1.xml><?xml version="1.0" encoding="utf-8"?>
-<p:sld xmlns:a="http://schemas.openxmlformats.org/drawingml/2006/main" xmlns:p="http://schemas.openxmlformats.org/presentationml/2006/main" xmlns:r="http://schemas.openxmlformats.org/officeDocument/2006/relationships">
+<p:sld xmlns:a="http://schemas.openxmlformats.org/drawingml/2006/main" xmlns:r="http://schemas.openxmlformats.org/officeDocument/2006/relationships" xmlns:p="http://schemas.openxmlformats.org/presentationml/2006/main">
   <p:cSld>
     <p:spTree>
       <p:nvGrpSpPr>
@@ -3105,7 +3566,14 @@
         <p:cNvGrpSpPr/>
         <p:nvPr/>
       </p:nvGrpSpPr>
-      <p:grpSpPr/>
+      <p:grpSpPr>
+        <a:xfrm>
+          <a:off x="0" y="0"/>
+          <a:ext cx="0" cy="0"/>
+          <a:chOff x="0" y="0"/>
+          <a:chExt cx="0" cy="0"/>
+        </a:xfrm>
+      </p:grpSpPr>
       <p:sp>
         <p:nvSpPr>
           <p:cNvPr id="2" name="Rectangle 1"/>
@@ -3146,6 +3614,7 @@
           <a:lstStyle/>
           <a:p>
             <a:pPr algn="ctr"/>
+            <a:endParaRPr/>
           </a:p>
         </p:txBody>
       </p:sp>
@@ -3158,7 +3627,7 @@
         <p:spPr>
           <a:xfrm>
             <a:off x="914400" y="1645920"/>
-            <a:ext cx="7315200" cy="731520"/>
+            <a:ext cx="7315200" cy="646331"/>
           </a:xfrm>
           <a:prstGeom prst="rect">
             <a:avLst/>
@@ -3180,6 +3649,7 @@
               </a:defRPr>
             </a:pPr>
             <a:r>
+              <a:rPr sz="3600" dirty="0"/>
               <a:t>Escalation to Client Details Report</a:t>
             </a:r>
           </a:p>
@@ -3216,6 +3686,7 @@
               </a:defRPr>
             </a:pPr>
             <a:r>
+              <a:rPr dirty="0"/>
               <a:t>Signature Tier</a:t>
             </a:r>
           </a:p>
@@ -3338,7 +3809,7 @@
 </file>
 
 <file path=ppt/slides/slide10.xml><?xml version="1.0" encoding="utf-8"?>
-<p:sld xmlns:a="http://schemas.openxmlformats.org/drawingml/2006/main" xmlns:p="http://schemas.openxmlformats.org/presentationml/2006/main" xmlns:r="http://schemas.openxmlformats.org/officeDocument/2006/relationships">
+<p:sld xmlns:a="http://schemas.openxmlformats.org/drawingml/2006/main" xmlns:r="http://schemas.openxmlformats.org/officeDocument/2006/relationships" xmlns:p="http://schemas.openxmlformats.org/presentationml/2006/main">
   <p:cSld>
     <p:spTree>
       <p:nvGrpSpPr>
@@ -3346,7 +3817,14 @@
         <p:cNvGrpSpPr/>
         <p:nvPr/>
       </p:nvGrpSpPr>
-      <p:grpSpPr/>
+      <p:grpSpPr>
+        <a:xfrm>
+          <a:off x="0" y="0"/>
+          <a:ext cx="0" cy="0"/>
+          <a:chOff x="0" y="0"/>
+          <a:chExt cx="0" cy="0"/>
+        </a:xfrm>
+      </p:grpSpPr>
       <p:sp>
         <p:nvSpPr>
           <p:cNvPr id="2" name="Rectangle 1"/>
@@ -3387,6 +3865,7 @@
           <a:lstStyle/>
           <a:p>
             <a:pPr algn="ctr"/>
+            <a:endParaRPr/>
           </a:p>
         </p:txBody>
       </p:sp>
@@ -3434,7 +3913,7 @@
         </p:nvSpPr>
         <p:spPr>
           <a:xfrm>
-            <a:off x="457200" y="1188720"/>
+            <a:off x="1005840" y="1188720"/>
             <a:ext cx="3566160" cy="1371600"/>
           </a:xfrm>
           <a:prstGeom prst="rect">
@@ -3468,6 +3947,7 @@
           <a:lstStyle/>
           <a:p>
             <a:pPr algn="ctr"/>
+            <a:endParaRPr/>
           </a:p>
         </p:txBody>
       </p:sp>
@@ -3479,7 +3959,7 @@
         </p:nvSpPr>
         <p:spPr>
           <a:xfrm>
-            <a:off x="594360" y="1371600"/>
+            <a:off x="1143000" y="1371600"/>
             <a:ext cx="3291840" cy="365760"/>
           </a:xfrm>
           <a:prstGeom prst="rect">
@@ -3515,7 +3995,7 @@
         </p:nvSpPr>
         <p:spPr>
           <a:xfrm>
-            <a:off x="594360" y="1828800"/>
+            <a:off x="1143000" y="1828800"/>
             <a:ext cx="3291840" cy="548640"/>
           </a:xfrm>
           <a:prstGeom prst="rect">
@@ -3551,7 +4031,7 @@
         </p:nvSpPr>
         <p:spPr>
           <a:xfrm>
-            <a:off x="4206240" y="1188720"/>
+            <a:off x="4754880" y="1188720"/>
             <a:ext cx="3566160" cy="1371600"/>
           </a:xfrm>
           <a:prstGeom prst="rect">
@@ -3585,6 +4065,7 @@
           <a:lstStyle/>
           <a:p>
             <a:pPr algn="ctr"/>
+            <a:endParaRPr/>
           </a:p>
         </p:txBody>
       </p:sp>
@@ -3596,7 +4077,7 @@
         </p:nvSpPr>
         <p:spPr>
           <a:xfrm>
-            <a:off x="4343400" y="1371600"/>
+            <a:off x="4892040" y="1371600"/>
             <a:ext cx="3291840" cy="365760"/>
           </a:xfrm>
           <a:prstGeom prst="rect">
@@ -3632,7 +4113,7 @@
         </p:nvSpPr>
         <p:spPr>
           <a:xfrm>
-            <a:off x="4343400" y="1828800"/>
+            <a:off x="4892040" y="1828800"/>
             <a:ext cx="3291840" cy="548640"/>
           </a:xfrm>
           <a:prstGeom prst="rect">
@@ -3668,7 +4149,7 @@
         </p:nvSpPr>
         <p:spPr>
           <a:xfrm>
-            <a:off x="457200" y="2743200"/>
+            <a:off x="1005840" y="2743200"/>
             <a:ext cx="3566160" cy="1371600"/>
           </a:xfrm>
           <a:prstGeom prst="rect">
@@ -3702,6 +4183,7 @@
           <a:lstStyle/>
           <a:p>
             <a:pPr algn="ctr"/>
+            <a:endParaRPr/>
           </a:p>
         </p:txBody>
       </p:sp>
@@ -3713,7 +4195,7 @@
         </p:nvSpPr>
         <p:spPr>
           <a:xfrm>
-            <a:off x="594360" y="2926080"/>
+            <a:off x="1143000" y="2926080"/>
             <a:ext cx="3291840" cy="365760"/>
           </a:xfrm>
           <a:prstGeom prst="rect">
@@ -3749,7 +4231,7 @@
         </p:nvSpPr>
         <p:spPr>
           <a:xfrm>
-            <a:off x="594360" y="3383280"/>
+            <a:off x="1143000" y="3383280"/>
             <a:ext cx="3291840" cy="548640"/>
           </a:xfrm>
           <a:prstGeom prst="rect">
@@ -3785,7 +4267,7 @@
         </p:nvSpPr>
         <p:spPr>
           <a:xfrm>
-            <a:off x="4206240" y="2743200"/>
+            <a:off x="4754880" y="2743200"/>
             <a:ext cx="3566160" cy="1371600"/>
           </a:xfrm>
           <a:prstGeom prst="rect">
@@ -3819,6 +4301,7 @@
           <a:lstStyle/>
           <a:p>
             <a:pPr algn="ctr"/>
+            <a:endParaRPr/>
           </a:p>
         </p:txBody>
       </p:sp>
@@ -3830,7 +4313,7 @@
         </p:nvSpPr>
         <p:spPr>
           <a:xfrm>
-            <a:off x="4343400" y="2926080"/>
+            <a:off x="4892040" y="2926080"/>
             <a:ext cx="3291840" cy="365760"/>
           </a:xfrm>
           <a:prstGeom prst="rect">
@@ -3866,7 +4349,7 @@
         </p:nvSpPr>
         <p:spPr>
           <a:xfrm>
-            <a:off x="4343400" y="3383280"/>
+            <a:off x="4892040" y="3383280"/>
             <a:ext cx="3291840" cy="548640"/>
           </a:xfrm>
           <a:prstGeom prst="rect">
@@ -3903,7 +4386,7 @@
         <p:spPr>
           <a:xfrm>
             <a:off x="457200" y="4572000"/>
-            <a:ext cx="8229600" cy="640080"/>
+            <a:ext cx="8229600" cy="480060"/>
           </a:xfrm>
           <a:prstGeom prst="rect">
             <a:avLst/>
@@ -3958,7 +4441,7 @@
 </file>
 
 <file path=ppt/slides/slide11.xml><?xml version="1.0" encoding="utf-8"?>
-<p:sld xmlns:a="http://schemas.openxmlformats.org/drawingml/2006/main" xmlns:p="http://schemas.openxmlformats.org/presentationml/2006/main" xmlns:r="http://schemas.openxmlformats.org/officeDocument/2006/relationships">
+<p:sld xmlns:a="http://schemas.openxmlformats.org/drawingml/2006/main" xmlns:r="http://schemas.openxmlformats.org/officeDocument/2006/relationships" xmlns:p="http://schemas.openxmlformats.org/presentationml/2006/main">
   <p:cSld>
     <p:spTree>
       <p:nvGrpSpPr>
@@ -3966,7 +4449,14 @@
         <p:cNvGrpSpPr/>
         <p:nvPr/>
       </p:nvGrpSpPr>
-      <p:grpSpPr/>
+      <p:grpSpPr>
+        <a:xfrm>
+          <a:off x="0" y="0"/>
+          <a:ext cx="0" cy="0"/>
+          <a:chOff x="0" y="0"/>
+          <a:chExt cx="0" cy="0"/>
+        </a:xfrm>
+      </p:grpSpPr>
       <p:sp>
         <p:nvSpPr>
           <p:cNvPr id="2" name="Rectangle 1"/>
@@ -4007,6 +4497,7 @@
           <a:lstStyle/>
           <a:p>
             <a:pPr algn="ctr"/>
+            <a:endParaRPr/>
           </a:p>
         </p:txBody>
       </p:sp>
@@ -4090,7 +4581,7 @@
         </p:nvSpPr>
         <p:spPr>
           <a:xfrm>
-            <a:off x="6858000" y="822960"/>
+            <a:off x="6492240" y="822960"/>
             <a:ext cx="1645920" cy="365760"/>
           </a:xfrm>
           <a:prstGeom prst="rect">
@@ -4143,7 +4634,7 @@
         </p:nvSpPr>
         <p:spPr>
           <a:xfrm>
-            <a:off x="457200" y="1463040"/>
+            <a:off x="457200" y="1280160"/>
             <a:ext cx="2377440" cy="1097280"/>
           </a:xfrm>
           <a:prstGeom prst="rect">
@@ -4177,6 +4668,7 @@
           <a:lstStyle/>
           <a:p>
             <a:pPr algn="ctr"/>
+            <a:endParaRPr/>
           </a:p>
         </p:txBody>
       </p:sp>
@@ -4188,8 +4680,8 @@
         </p:nvSpPr>
         <p:spPr>
           <a:xfrm>
-            <a:off x="548640" y="1645920"/>
-            <a:ext cx="2194560" cy="457200"/>
+            <a:off x="548640" y="1463040"/>
+            <a:ext cx="2194560" cy="646331"/>
           </a:xfrm>
           <a:prstGeom prst="rect">
             <a:avLst/>
@@ -4224,8 +4716,8 @@
         </p:nvSpPr>
         <p:spPr>
           <a:xfrm>
-            <a:off x="548640" y="2103120"/>
-            <a:ext cx="2194560" cy="365760"/>
+            <a:off x="548640" y="1920240"/>
+            <a:ext cx="2194560" cy="307777"/>
           </a:xfrm>
           <a:prstGeom prst="rect">
             <a:avLst/>
@@ -4260,7 +4752,7 @@
         </p:nvSpPr>
         <p:spPr>
           <a:xfrm>
-            <a:off x="3017520" y="1463040"/>
+            <a:off x="457200" y="2502337"/>
             <a:ext cx="2377440" cy="1097280"/>
           </a:xfrm>
           <a:prstGeom prst="rect">
@@ -4294,6 +4786,7 @@
           <a:lstStyle/>
           <a:p>
             <a:pPr algn="ctr"/>
+            <a:endParaRPr/>
           </a:p>
         </p:txBody>
       </p:sp>
@@ -4305,7 +4798,7 @@
         </p:nvSpPr>
         <p:spPr>
           <a:xfrm>
-            <a:off x="3108960" y="1645920"/>
+            <a:off x="548640" y="2685217"/>
             <a:ext cx="2194560" cy="457200"/>
           </a:xfrm>
           <a:prstGeom prst="rect">
@@ -4341,7 +4834,7 @@
         </p:nvSpPr>
         <p:spPr>
           <a:xfrm>
-            <a:off x="3108960" y="2103120"/>
+            <a:off x="548640" y="3142417"/>
             <a:ext cx="2194560" cy="365760"/>
           </a:xfrm>
           <a:prstGeom prst="rect">
@@ -4377,7 +4870,7 @@
         </p:nvSpPr>
         <p:spPr>
           <a:xfrm>
-            <a:off x="5577840" y="1463040"/>
+            <a:off x="457200" y="3726180"/>
             <a:ext cx="2377440" cy="1097280"/>
           </a:xfrm>
           <a:prstGeom prst="rect">
@@ -4411,6 +4904,7 @@
           <a:lstStyle/>
           <a:p>
             <a:pPr algn="ctr"/>
+            <a:endParaRPr/>
           </a:p>
         </p:txBody>
       </p:sp>
@@ -4422,7 +4916,7 @@
         </p:nvSpPr>
         <p:spPr>
           <a:xfrm>
-            <a:off x="5669280" y="1645920"/>
+            <a:off x="548640" y="3909060"/>
             <a:ext cx="2194560" cy="457200"/>
           </a:xfrm>
           <a:prstGeom prst="rect">
@@ -4458,7 +4952,7 @@
         </p:nvSpPr>
         <p:spPr>
           <a:xfrm>
-            <a:off x="5669280" y="2103120"/>
+            <a:off x="548640" y="4366260"/>
             <a:ext cx="2194560" cy="365760"/>
           </a:xfrm>
           <a:prstGeom prst="rect">
@@ -4494,8 +4988,8 @@
         </p:nvSpPr>
         <p:spPr>
           <a:xfrm>
-            <a:off x="731520" y="4846320"/>
-            <a:ext cx="7680960" cy="731520"/>
+            <a:off x="2926080" y="4411980"/>
+            <a:ext cx="6080760" cy="461665"/>
           </a:xfrm>
           <a:prstGeom prst="rect">
             <a:avLst/>
@@ -4517,47 +5011,15 @@
               </a:defRPr>
             </a:pPr>
             <a:r>
+              <a:rPr sz="1200" dirty="0"/>
               <a:t>• 34 escalations upgraded (12.7%) - CS raised severity based on business impact</a:t>
             </a:r>
-            <a:br/>
-            <a:r>
+            <a:br>
+              <a:rPr sz="1200" dirty="0"/>
+            </a:br>
+            <a:r>
+              <a:rPr sz="1200" dirty="0"/>
               <a:t>• 65 escalations de-escalated (24.3%) - CS reduced noise from vendor over-classification</a:t>
-            </a:r>
-          </a:p>
-        </p:txBody>
-      </p:sp>
-      <p:sp>
-        <p:nvSpPr>
-          <p:cNvPr id="17" name="TextBox 16"/>
-          <p:cNvSpPr txBox="1"/>
-          <p:nvPr/>
-        </p:nvSpPr>
-        <p:spPr>
-          <a:xfrm>
-            <a:off x="457200" y="4686300"/>
-            <a:ext cx="8229600" cy="274320"/>
-          </a:xfrm>
-          <a:prstGeom prst="rect">
-            <a:avLst/>
-          </a:prstGeom>
-          <a:noFill/>
-        </p:spPr>
-        <p:txBody>
-          <a:bodyPr wrap="square">
-            <a:spAutoFit/>
-          </a:bodyPr>
-          <a:lstStyle/>
-          <a:p>
-            <a:pPr algn="l">
-              <a:defRPr sz="1000" i="1">
-                <a:solidFill>
-                  <a:srgbClr val="343741"/>
-                </a:solidFill>
-                <a:latin typeface="Calibri"/>
-              </a:defRPr>
-            </a:pPr>
-            <a:r>
-              <a:t>Source: Vendor Severity (col 45) vs. Current Priority (col 13)</a:t>
             </a:r>
           </a:p>
         </p:txBody>
@@ -4578,8 +5040,8 @@
         </p:blipFill>
         <p:spPr>
           <a:xfrm>
-            <a:off x="731520" y="2834640"/>
-            <a:ext cx="7680960" cy="1828800"/>
+            <a:off x="2926080" y="1280160"/>
+            <a:ext cx="6080760" cy="3040380"/>
           </a:xfrm>
           <a:prstGeom prst="rect">
             <a:avLst/>
@@ -4595,7 +5057,7 @@
 </file>
 
 <file path=ppt/slides/slide12.xml><?xml version="1.0" encoding="utf-8"?>
-<p:sld xmlns:a="http://schemas.openxmlformats.org/drawingml/2006/main" xmlns:p="http://schemas.openxmlformats.org/presentationml/2006/main" xmlns:r="http://schemas.openxmlformats.org/officeDocument/2006/relationships">
+<p:sld xmlns:a="http://schemas.openxmlformats.org/drawingml/2006/main" xmlns:r="http://schemas.openxmlformats.org/officeDocument/2006/relationships" xmlns:p="http://schemas.openxmlformats.org/presentationml/2006/main">
   <p:cSld>
     <p:spTree>
       <p:nvGrpSpPr>
@@ -4603,7 +5065,14 @@
         <p:cNvGrpSpPr/>
         <p:nvPr/>
       </p:nvGrpSpPr>
-      <p:grpSpPr/>
+      <p:grpSpPr>
+        <a:xfrm>
+          <a:off x="0" y="0"/>
+          <a:ext cx="0" cy="0"/>
+          <a:chOff x="0" y="0"/>
+          <a:chExt cx="0" cy="0"/>
+        </a:xfrm>
+      </p:grpSpPr>
       <p:sp>
         <p:nvSpPr>
           <p:cNvPr id="2" name="Rectangle 1"/>
@@ -4644,6 +5113,7 @@
           <a:lstStyle/>
           <a:p>
             <a:pPr algn="ctr"/>
+            <a:endParaRPr/>
           </a:p>
         </p:txBody>
       </p:sp>
@@ -4728,7 +5198,7 @@
         <p:spPr>
           <a:xfrm>
             <a:off x="731520" y="4572000"/>
-            <a:ext cx="7680960" cy="548640"/>
+            <a:ext cx="7680960" cy="365760"/>
           </a:xfrm>
           <a:prstGeom prst="rect">
             <a:avLst/>
@@ -4774,42 +5244,6 @@
           </a:p>
         </p:txBody>
       </p:sp>
-      <p:sp>
-        <p:nvSpPr>
-          <p:cNvPr id="7" name="TextBox 6"/>
-          <p:cNvSpPr txBox="1"/>
-          <p:nvPr/>
-        </p:nvSpPr>
-        <p:spPr>
-          <a:xfrm>
-            <a:off x="457200" y="4686300"/>
-            <a:ext cx="8229600" cy="274320"/>
-          </a:xfrm>
-          <a:prstGeom prst="rect">
-            <a:avLst/>
-          </a:prstGeom>
-          <a:noFill/>
-        </p:spPr>
-        <p:txBody>
-          <a:bodyPr wrap="square">
-            <a:spAutoFit/>
-          </a:bodyPr>
-          <a:lstStyle/>
-          <a:p>
-            <a:pPr algn="l">
-              <a:defRPr sz="1000" i="1">
-                <a:solidFill>
-                  <a:srgbClr val="343741"/>
-                </a:solidFill>
-                <a:latin typeface="Calibri"/>
-              </a:defRPr>
-            </a:pPr>
-            <a:r>
-              <a:t>Source: MITRE ATT&amp;CK Tactic (col X) and Current Priority (col 13)</a:t>
-            </a:r>
-          </a:p>
-        </p:txBody>
-      </p:sp>
       <p:pic>
         <p:nvPicPr>
           <p:cNvPr id="8" name="Picture 7" descr="stacked_bar_chart.png"/>
@@ -4826,8 +5260,8 @@
         </p:blipFill>
         <p:spPr>
           <a:xfrm>
-            <a:off x="731520" y="1097280"/>
-            <a:ext cx="7680960" cy="2743200"/>
+            <a:off x="1828800" y="1097280"/>
+            <a:ext cx="5486400" cy="2743200"/>
           </a:xfrm>
           <a:prstGeom prst="rect">
             <a:avLst/>
@@ -4843,7 +5277,7 @@
 </file>
 
 <file path=ppt/slides/slide13.xml><?xml version="1.0" encoding="utf-8"?>
-<p:sld xmlns:a="http://schemas.openxmlformats.org/drawingml/2006/main" xmlns:p="http://schemas.openxmlformats.org/presentationml/2006/main" xmlns:r="http://schemas.openxmlformats.org/officeDocument/2006/relationships">
+<p:sld xmlns:a="http://schemas.openxmlformats.org/drawingml/2006/main" xmlns:r="http://schemas.openxmlformats.org/officeDocument/2006/relationships" xmlns:p="http://schemas.openxmlformats.org/presentationml/2006/main">
   <p:cSld>
     <p:spTree>
       <p:nvGrpSpPr>
@@ -4851,7 +5285,14 @@
         <p:cNvGrpSpPr/>
         <p:nvPr/>
       </p:nvGrpSpPr>
-      <p:grpSpPr/>
+      <p:grpSpPr>
+        <a:xfrm>
+          <a:off x="0" y="0"/>
+          <a:ext cx="0" cy="0"/>
+          <a:chOff x="0" y="0"/>
+          <a:chExt cx="0" cy="0"/>
+        </a:xfrm>
+      </p:grpSpPr>
       <p:sp>
         <p:nvSpPr>
           <p:cNvPr id="2" name="Rectangle 1"/>
@@ -4892,6 +5333,7 @@
           <a:lstStyle/>
           <a:p>
             <a:pPr algn="ctr"/>
+            <a:endParaRPr/>
           </a:p>
         </p:txBody>
       </p:sp>
@@ -4939,7 +5381,7 @@
         </p:nvSpPr>
         <p:spPr>
           <a:xfrm>
-            <a:off x="457200" y="1097280"/>
+            <a:off x="822960" y="1138844"/>
             <a:ext cx="2377440" cy="3200400"/>
           </a:xfrm>
           <a:prstGeom prst="rect">
@@ -4973,6 +5415,7 @@
           <a:lstStyle/>
           <a:p>
             <a:pPr algn="ctr"/>
+            <a:endParaRPr/>
           </a:p>
         </p:txBody>
       </p:sp>
@@ -4984,7 +5427,7 @@
         </p:nvSpPr>
         <p:spPr>
           <a:xfrm>
-            <a:off x="594360" y="1371600"/>
+            <a:off x="960120" y="1413164"/>
             <a:ext cx="2103120" cy="548640"/>
           </a:xfrm>
           <a:prstGeom prst="rect">
@@ -5020,7 +5463,7 @@
         </p:nvSpPr>
         <p:spPr>
           <a:xfrm>
-            <a:off x="594360" y="2103120"/>
+            <a:off x="960120" y="2144684"/>
             <a:ext cx="2103120" cy="457200"/>
           </a:xfrm>
           <a:prstGeom prst="rect">
@@ -5056,7 +5499,7 @@
         </p:nvSpPr>
         <p:spPr>
           <a:xfrm>
-            <a:off x="594360" y="2834640"/>
+            <a:off x="960120" y="2876204"/>
             <a:ext cx="2103120" cy="914400"/>
           </a:xfrm>
           <a:prstGeom prst="rect">
@@ -5109,7 +5552,7 @@
         </p:nvSpPr>
         <p:spPr>
           <a:xfrm>
-            <a:off x="594360" y="3840480"/>
+            <a:off x="960120" y="3882044"/>
             <a:ext cx="2103120" cy="365760"/>
           </a:xfrm>
           <a:prstGeom prst="rect">
@@ -5145,7 +5588,7 @@
         </p:nvSpPr>
         <p:spPr>
           <a:xfrm>
-            <a:off x="3017520" y="1097280"/>
+            <a:off x="3383280" y="1138844"/>
             <a:ext cx="2377440" cy="3200400"/>
           </a:xfrm>
           <a:prstGeom prst="rect">
@@ -5179,6 +5622,7 @@
           <a:lstStyle/>
           <a:p>
             <a:pPr algn="ctr"/>
+            <a:endParaRPr/>
           </a:p>
         </p:txBody>
       </p:sp>
@@ -5190,7 +5634,7 @@
         </p:nvSpPr>
         <p:spPr>
           <a:xfrm>
-            <a:off x="3154680" y="1371600"/>
+            <a:off x="3520440" y="1413164"/>
             <a:ext cx="2103120" cy="548640"/>
           </a:xfrm>
           <a:prstGeom prst="rect">
@@ -5226,7 +5670,7 @@
         </p:nvSpPr>
         <p:spPr>
           <a:xfrm>
-            <a:off x="3154680" y="2103120"/>
+            <a:off x="3520440" y="2144684"/>
             <a:ext cx="2103120" cy="457200"/>
           </a:xfrm>
           <a:prstGeom prst="rect">
@@ -5262,7 +5706,7 @@
         </p:nvSpPr>
         <p:spPr>
           <a:xfrm>
-            <a:off x="3154680" y="2834640"/>
+            <a:off x="3520440" y="2876204"/>
             <a:ext cx="2103120" cy="914400"/>
           </a:xfrm>
           <a:prstGeom prst="rect">
@@ -5315,7 +5759,7 @@
         </p:nvSpPr>
         <p:spPr>
           <a:xfrm>
-            <a:off x="3154680" y="3840480"/>
+            <a:off x="3520440" y="3882044"/>
             <a:ext cx="2103120" cy="365760"/>
           </a:xfrm>
           <a:prstGeom prst="rect">
@@ -5351,7 +5795,7 @@
         </p:nvSpPr>
         <p:spPr>
           <a:xfrm>
-            <a:off x="5577840" y="1097280"/>
+            <a:off x="5943600" y="1138844"/>
             <a:ext cx="2377440" cy="3200400"/>
           </a:xfrm>
           <a:prstGeom prst="rect">
@@ -5385,6 +5829,7 @@
           <a:lstStyle/>
           <a:p>
             <a:pPr algn="ctr"/>
+            <a:endParaRPr/>
           </a:p>
         </p:txBody>
       </p:sp>
@@ -5396,7 +5841,7 @@
         </p:nvSpPr>
         <p:spPr>
           <a:xfrm>
-            <a:off x="5715000" y="1371600"/>
+            <a:off x="6080760" y="1413164"/>
             <a:ext cx="2103120" cy="548640"/>
           </a:xfrm>
           <a:prstGeom prst="rect">
@@ -5432,7 +5877,7 @@
         </p:nvSpPr>
         <p:spPr>
           <a:xfrm>
-            <a:off x="5715000" y="2103120"/>
+            <a:off x="6080760" y="2144684"/>
             <a:ext cx="2103120" cy="457200"/>
           </a:xfrm>
           <a:prstGeom prst="rect">
@@ -5468,7 +5913,7 @@
         </p:nvSpPr>
         <p:spPr>
           <a:xfrm>
-            <a:off x="5715000" y="2834640"/>
+            <a:off x="6080760" y="2876204"/>
             <a:ext cx="2103120" cy="914400"/>
           </a:xfrm>
           <a:prstGeom prst="rect">
@@ -5521,7 +5966,7 @@
         </p:nvSpPr>
         <p:spPr>
           <a:xfrm>
-            <a:off x="5715000" y="3840480"/>
+            <a:off x="6080760" y="3882044"/>
             <a:ext cx="2103120" cy="365760"/>
           </a:xfrm>
           <a:prstGeom prst="rect">
@@ -5558,7 +6003,7 @@
 </file>
 
 <file path=ppt/slides/slide14.xml><?xml version="1.0" encoding="utf-8"?>
-<p:sld xmlns:a="http://schemas.openxmlformats.org/drawingml/2006/main" xmlns:p="http://schemas.openxmlformats.org/presentationml/2006/main" xmlns:r="http://schemas.openxmlformats.org/officeDocument/2006/relationships">
+<p:sld xmlns:a="http://schemas.openxmlformats.org/drawingml/2006/main" xmlns:r="http://schemas.openxmlformats.org/officeDocument/2006/relationships" xmlns:p="http://schemas.openxmlformats.org/presentationml/2006/main">
   <p:cSld>
     <p:spTree>
       <p:nvGrpSpPr>
@@ -5566,7 +6011,14 @@
         <p:cNvGrpSpPr/>
         <p:nvPr/>
       </p:nvGrpSpPr>
-      <p:grpSpPr/>
+      <p:grpSpPr>
+        <a:xfrm>
+          <a:off x="0" y="0"/>
+          <a:ext cx="0" cy="0"/>
+          <a:chOff x="0" y="0"/>
+          <a:chExt cx="0" cy="0"/>
+        </a:xfrm>
+      </p:grpSpPr>
       <p:sp>
         <p:nvSpPr>
           <p:cNvPr id="2" name="Rectangle 1"/>
@@ -5607,6 +6059,7 @@
           <a:lstStyle/>
           <a:p>
             <a:pPr algn="ctr"/>
+            <a:endParaRPr/>
           </a:p>
         </p:txBody>
       </p:sp>
@@ -5655,7 +6108,7 @@
         <p:spPr>
           <a:xfrm>
             <a:off x="457200" y="1097280"/>
-            <a:ext cx="8229600" cy="1188720"/>
+            <a:ext cx="7863840" cy="1188720"/>
           </a:xfrm>
           <a:prstGeom prst="rect">
             <a:avLst/>
@@ -5688,6 +6141,7 @@
           <a:lstStyle/>
           <a:p>
             <a:pPr algn="ctr"/>
+            <a:endParaRPr/>
           </a:p>
         </p:txBody>
       </p:sp>
@@ -5700,7 +6154,7 @@
         <p:spPr>
           <a:xfrm>
             <a:off x="640080" y="1234440"/>
-            <a:ext cx="914400" cy="320040"/>
+            <a:ext cx="873760" cy="320040"/>
           </a:xfrm>
           <a:prstGeom prst="rect">
             <a:avLst/>
@@ -5753,7 +6207,7 @@
         <p:spPr>
           <a:xfrm>
             <a:off x="1737360" y="1234440"/>
-            <a:ext cx="6766560" cy="320040"/>
+            <a:ext cx="6465824" cy="338554"/>
           </a:xfrm>
           <a:prstGeom prst="rect">
             <a:avLst/>
@@ -5789,7 +6243,7 @@
         <p:spPr>
           <a:xfrm>
             <a:off x="640080" y="1691640"/>
-            <a:ext cx="7863840" cy="365760"/>
+            <a:ext cx="7514336" cy="461665"/>
           </a:xfrm>
           <a:prstGeom prst="rect">
             <a:avLst/>
@@ -5811,21 +6265,37 @@
               </a:defRPr>
             </a:pPr>
             <a:r>
+              <a:rPr dirty="0"/>
               <a:t>Palo Alto Cortex XDR false positive rate is 11.2%, exceeding the 10.0% threshold</a:t>
             </a:r>
-          </a:p>
-        </p:txBody>
-      </p:sp>
-      <p:sp>
-        <p:nvSpPr>
-          <p:cNvPr id="8" name="TextBox 7"/>
+            <a:endParaRPr lang="en-US" dirty="0"/>
+          </a:p>
+          <a:p>
+            <a:pPr>
+              <a:defRPr sz="1200">
+                <a:solidFill>
+                  <a:srgbClr val="343741"/>
+                </a:solidFill>
+                <a:latin typeface="Calibri"/>
+              </a:defRPr>
+            </a:pPr>
+            <a:r>
+              <a:rPr lang="en-US" dirty="0"/>
+              <a:t>Owner: CS SOC + Lennar Security Team | Target: Next 30 days</a:t>
+            </a:r>
+          </a:p>
+        </p:txBody>
+      </p:sp>
+      <p:sp>
+        <p:nvSpPr>
+          <p:cNvPr id="9" name="TextBox 8"/>
           <p:cNvSpPr txBox="1"/>
           <p:nvPr/>
         </p:nvSpPr>
         <p:spPr>
           <a:xfrm>
-            <a:off x="640080" y="2148840"/>
-            <a:ext cx="7863840" cy="320040"/>
+            <a:off x="640080" y="2514600"/>
+            <a:ext cx="7514336" cy="261610"/>
           </a:xfrm>
           <a:prstGeom prst="rect">
             <a:avLst/>
@@ -5839,42 +6309,6 @@
           <a:lstStyle/>
           <a:p>
             <a:pPr algn="l">
-              <a:defRPr sz="1100">
-                <a:solidFill>
-                  <a:srgbClr val="343741"/>
-                </a:solidFill>
-                <a:latin typeface="Calibri"/>
-              </a:defRPr>
-            </a:pPr>
-            <a:r>
-              <a:t>Owner: CS SOC + Lennar Security Team | Target: Next 30 days</a:t>
-            </a:r>
-          </a:p>
-        </p:txBody>
-      </p:sp>
-      <p:sp>
-        <p:nvSpPr>
-          <p:cNvPr id="9" name="TextBox 8"/>
-          <p:cNvSpPr txBox="1"/>
-          <p:nvPr/>
-        </p:nvSpPr>
-        <p:spPr>
-          <a:xfrm>
-            <a:off x="640080" y="2514600"/>
-            <a:ext cx="7863840" cy="320040"/>
-          </a:xfrm>
-          <a:prstGeom prst="rect">
-            <a:avLst/>
-          </a:prstGeom>
-          <a:noFill/>
-        </p:spPr>
-        <p:txBody>
-          <a:bodyPr wrap="square">
-            <a:spAutoFit/>
-          </a:bodyPr>
-          <a:lstStyle/>
-          <a:p>
-            <a:pPr algn="l">
               <a:defRPr sz="1100" b="1">
                 <a:solidFill>
                   <a:srgbClr val="004C97"/>
@@ -5897,7 +6331,7 @@
         <p:spPr>
           <a:xfrm>
             <a:off x="457200" y="2468880"/>
-            <a:ext cx="8229600" cy="1188720"/>
+            <a:ext cx="7863840" cy="1188720"/>
           </a:xfrm>
           <a:prstGeom prst="rect">
             <a:avLst/>
@@ -5930,6 +6364,7 @@
           <a:lstStyle/>
           <a:p>
             <a:pPr algn="ctr"/>
+            <a:endParaRPr/>
           </a:p>
         </p:txBody>
       </p:sp>
@@ -5942,7 +6377,7 @@
         <p:spPr>
           <a:xfrm>
             <a:off x="640080" y="2606040"/>
-            <a:ext cx="914400" cy="320040"/>
+            <a:ext cx="873760" cy="320040"/>
           </a:xfrm>
           <a:prstGeom prst="rect">
             <a:avLst/>
@@ -5995,7 +6430,7 @@
         <p:spPr>
           <a:xfrm>
             <a:off x="1737360" y="2606040"/>
-            <a:ext cx="6766560" cy="320040"/>
+            <a:ext cx="6465824" cy="338554"/>
           </a:xfrm>
           <a:prstGeom prst="rect">
             <a:avLst/>
@@ -6031,7 +6466,7 @@
         <p:spPr>
           <a:xfrm>
             <a:off x="640080" y="3063240"/>
-            <a:ext cx="7863840" cy="365760"/>
+            <a:ext cx="7514336" cy="646331"/>
           </a:xfrm>
           <a:prstGeom prst="rect">
             <a:avLst/>
@@ -6053,21 +6488,48 @@
               </a:defRPr>
             </a:pPr>
             <a:r>
+              <a:rPr dirty="0"/>
               <a:t>Manual escalations at 14% exceed 12% target. 38 incidents required analyst judgment</a:t>
             </a:r>
-          </a:p>
-        </p:txBody>
-      </p:sp>
-      <p:sp>
-        <p:nvSpPr>
-          <p:cNvPr id="14" name="TextBox 13"/>
+            <a:endParaRPr lang="en-US" dirty="0"/>
+          </a:p>
+          <a:p>
+            <a:pPr>
+              <a:defRPr sz="1200">
+                <a:solidFill>
+                  <a:srgbClr val="343741"/>
+                </a:solidFill>
+                <a:latin typeface="Calibri"/>
+              </a:defRPr>
+            </a:pPr>
+            <a:r>
+              <a:rPr lang="en-US" dirty="0"/>
+              <a:t>Owner: CS SOC Engineering | Target: Next 60 days</a:t>
+            </a:r>
+          </a:p>
+          <a:p>
+            <a:pPr algn="l">
+              <a:defRPr sz="1200">
+                <a:solidFill>
+                  <a:srgbClr val="343741"/>
+                </a:solidFill>
+                <a:latin typeface="Calibri"/>
+              </a:defRPr>
+            </a:pPr>
+            <a:endParaRPr dirty="0"/>
+          </a:p>
+        </p:txBody>
+      </p:sp>
+      <p:sp>
+        <p:nvSpPr>
+          <p:cNvPr id="15" name="TextBox 14"/>
           <p:cNvSpPr txBox="1"/>
           <p:nvPr/>
         </p:nvSpPr>
         <p:spPr>
           <a:xfrm>
-            <a:off x="640080" y="3520440"/>
-            <a:ext cx="7863840" cy="320040"/>
+            <a:off x="640080" y="3886200"/>
+            <a:ext cx="7514336" cy="261610"/>
           </a:xfrm>
           <a:prstGeom prst="rect">
             <a:avLst/>
@@ -6081,42 +6543,6 @@
           <a:lstStyle/>
           <a:p>
             <a:pPr algn="l">
-              <a:defRPr sz="1100">
-                <a:solidFill>
-                  <a:srgbClr val="343741"/>
-                </a:solidFill>
-                <a:latin typeface="Calibri"/>
-              </a:defRPr>
-            </a:pPr>
-            <a:r>
-              <a:t>Owner: CS SOC Engineering | Target: Next 60 days</a:t>
-            </a:r>
-          </a:p>
-        </p:txBody>
-      </p:sp>
-      <p:sp>
-        <p:nvSpPr>
-          <p:cNvPr id="15" name="TextBox 14"/>
-          <p:cNvSpPr txBox="1"/>
-          <p:nvPr/>
-        </p:nvSpPr>
-        <p:spPr>
-          <a:xfrm>
-            <a:off x="640080" y="3886200"/>
-            <a:ext cx="7863840" cy="320040"/>
-          </a:xfrm>
-          <a:prstGeom prst="rect">
-            <a:avLst/>
-          </a:prstGeom>
-          <a:noFill/>
-        </p:spPr>
-        <p:txBody>
-          <a:bodyPr wrap="square">
-            <a:spAutoFit/>
-          </a:bodyPr>
-          <a:lstStyle/>
-          <a:p>
-            <a:pPr algn="l">
               <a:defRPr sz="1100" b="1">
                 <a:solidFill>
                   <a:srgbClr val="004C97"/>
@@ -6139,7 +6565,7 @@
         <p:spPr>
           <a:xfrm>
             <a:off x="457200" y="3840480"/>
-            <a:ext cx="8229600" cy="1188720"/>
+            <a:ext cx="7863840" cy="1188720"/>
           </a:xfrm>
           <a:prstGeom prst="rect">
             <a:avLst/>
@@ -6172,6 +6598,7 @@
           <a:lstStyle/>
           <a:p>
             <a:pPr algn="ctr"/>
+            <a:endParaRPr/>
           </a:p>
         </p:txBody>
       </p:sp>
@@ -6184,7 +6611,7 @@
         <p:spPr>
           <a:xfrm>
             <a:off x="640080" y="3977640"/>
-            <a:ext cx="914400" cy="320040"/>
+            <a:ext cx="873760" cy="320040"/>
           </a:xfrm>
           <a:prstGeom prst="rect">
             <a:avLst/>
@@ -6237,7 +6664,7 @@
         <p:spPr>
           <a:xfrm>
             <a:off x="1737360" y="3977640"/>
-            <a:ext cx="6766560" cy="320040"/>
+            <a:ext cx="6465824" cy="338554"/>
           </a:xfrm>
           <a:prstGeom prst="rect">
             <a:avLst/>
@@ -6273,7 +6700,7 @@
         <p:spPr>
           <a:xfrm>
             <a:off x="640080" y="4434840"/>
-            <a:ext cx="7863840" cy="365760"/>
+            <a:ext cx="7514336" cy="461665"/>
           </a:xfrm>
           <a:prstGeom prst="rect">
             <a:avLst/>
@@ -6295,35 +6722,14 @@
               </a:defRPr>
             </a:pPr>
             <a:r>
+              <a:rPr dirty="0"/>
               <a:t>Persistence + Defense Evasion account for 67% of high-severity incidents</a:t>
             </a:r>
-          </a:p>
-        </p:txBody>
-      </p:sp>
-      <p:sp>
-        <p:nvSpPr>
-          <p:cNvPr id="20" name="TextBox 19"/>
-          <p:cNvSpPr txBox="1"/>
-          <p:nvPr/>
-        </p:nvSpPr>
-        <p:spPr>
-          <a:xfrm>
-            <a:off x="640080" y="4892040"/>
-            <a:ext cx="7863840" cy="320040"/>
-          </a:xfrm>
-          <a:prstGeom prst="rect">
-            <a:avLst/>
-          </a:prstGeom>
-          <a:noFill/>
-        </p:spPr>
-        <p:txBody>
-          <a:bodyPr wrap="square">
-            <a:spAutoFit/>
-          </a:bodyPr>
-          <a:lstStyle/>
-          <a:p>
-            <a:pPr algn="l">
-              <a:defRPr sz="1100">
+            <a:endParaRPr lang="en-US" dirty="0"/>
+          </a:p>
+          <a:p>
+            <a:pPr>
+              <a:defRPr sz="1200">
                 <a:solidFill>
                   <a:srgbClr val="343741"/>
                 </a:solidFill>
@@ -6331,6 +6737,7 @@
               </a:defRPr>
             </a:pPr>
             <a:r>
+              <a:rPr lang="en-US" dirty="0"/>
               <a:t>Owner: Joint - CS Threat Intel + Lennar | Target: Ongoing</a:t>
             </a:r>
           </a:p>
@@ -6381,7 +6788,7 @@
 </file>
 
 <file path=ppt/slides/slide15.xml><?xml version="1.0" encoding="utf-8"?>
-<p:sld xmlns:a="http://schemas.openxmlformats.org/drawingml/2006/main" xmlns:p="http://schemas.openxmlformats.org/presentationml/2006/main" xmlns:r="http://schemas.openxmlformats.org/officeDocument/2006/relationships">
+<p:sld xmlns:a="http://schemas.openxmlformats.org/drawingml/2006/main" xmlns:r="http://schemas.openxmlformats.org/officeDocument/2006/relationships" xmlns:p="http://schemas.openxmlformats.org/presentationml/2006/main">
   <p:cSld>
     <p:spTree>
       <p:nvGrpSpPr>
@@ -6389,7 +6796,14 @@
         <p:cNvGrpSpPr/>
         <p:nvPr/>
       </p:nvGrpSpPr>
-      <p:grpSpPr/>
+      <p:grpSpPr>
+        <a:xfrm>
+          <a:off x="0" y="0"/>
+          <a:ext cx="0" cy="0"/>
+          <a:chOff x="0" y="0"/>
+          <a:chExt cx="0" cy="0"/>
+        </a:xfrm>
+      </p:grpSpPr>
       <p:sp>
         <p:nvSpPr>
           <p:cNvPr id="2" name="Rectangle 1"/>
@@ -6430,6 +6844,7 @@
           <a:lstStyle/>
           <a:p>
             <a:pPr algn="ctr"/>
+            <a:endParaRPr/>
           </a:p>
         </p:txBody>
       </p:sp>
@@ -6477,7 +6892,7 @@
         </p:nvSpPr>
         <p:spPr>
           <a:xfrm>
-            <a:off x="457200" y="1097280"/>
+            <a:off x="548640" y="1088967"/>
             <a:ext cx="3749040" cy="3200400"/>
           </a:xfrm>
           <a:prstGeom prst="rect">
@@ -6511,6 +6926,7 @@
           <a:lstStyle/>
           <a:p>
             <a:pPr algn="ctr"/>
+            <a:endParaRPr/>
           </a:p>
         </p:txBody>
       </p:sp>
@@ -6522,7 +6938,7 @@
         </p:nvSpPr>
         <p:spPr>
           <a:xfrm>
-            <a:off x="640080" y="1280160"/>
+            <a:off x="731520" y="1271847"/>
             <a:ext cx="3383280" cy="365760"/>
           </a:xfrm>
           <a:prstGeom prst="rect">
@@ -6558,7 +6974,7 @@
         </p:nvSpPr>
         <p:spPr>
           <a:xfrm>
-            <a:off x="640080" y="1920240"/>
+            <a:off x="731520" y="1911927"/>
             <a:ext cx="3383280" cy="457200"/>
           </a:xfrm>
           <a:prstGeom prst="rect">
@@ -6594,7 +7010,7 @@
         </p:nvSpPr>
         <p:spPr>
           <a:xfrm>
-            <a:off x="640080" y="2560320"/>
+            <a:off x="731520" y="2552007"/>
             <a:ext cx="3383280" cy="457200"/>
           </a:xfrm>
           <a:prstGeom prst="rect">
@@ -6630,7 +7046,7 @@
         </p:nvSpPr>
         <p:spPr>
           <a:xfrm>
-            <a:off x="640080" y="3200400"/>
+            <a:off x="731520" y="3192087"/>
             <a:ext cx="3383280" cy="457200"/>
           </a:xfrm>
           <a:prstGeom prst="rect">
@@ -6666,7 +7082,7 @@
         </p:nvSpPr>
         <p:spPr>
           <a:xfrm>
-            <a:off x="4480560" y="1097280"/>
+            <a:off x="4572000" y="1088967"/>
             <a:ext cx="3749040" cy="3200400"/>
           </a:xfrm>
           <a:prstGeom prst="rect">
@@ -6700,6 +7116,7 @@
           <a:lstStyle/>
           <a:p>
             <a:pPr algn="ctr"/>
+            <a:endParaRPr/>
           </a:p>
         </p:txBody>
       </p:sp>
@@ -6711,7 +7128,7 @@
         </p:nvSpPr>
         <p:spPr>
           <a:xfrm>
-            <a:off x="4663440" y="1280160"/>
+            <a:off x="4754880" y="1271847"/>
             <a:ext cx="3383280" cy="365760"/>
           </a:xfrm>
           <a:prstGeom prst="rect">
@@ -6747,7 +7164,7 @@
         </p:nvSpPr>
         <p:spPr>
           <a:xfrm>
-            <a:off x="4663440" y="1920240"/>
+            <a:off x="4754880" y="1911927"/>
             <a:ext cx="3383280" cy="457200"/>
           </a:xfrm>
           <a:prstGeom prst="rect">
@@ -6783,7 +7200,7 @@
         </p:nvSpPr>
         <p:spPr>
           <a:xfrm>
-            <a:off x="4663440" y="2560320"/>
+            <a:off x="4754880" y="2552007"/>
             <a:ext cx="3383280" cy="457200"/>
           </a:xfrm>
           <a:prstGeom prst="rect">
@@ -6819,7 +7236,7 @@
         </p:nvSpPr>
         <p:spPr>
           <a:xfrm>
-            <a:off x="4663440" y="3200400"/>
+            <a:off x="4754880" y="3192087"/>
             <a:ext cx="3383280" cy="457200"/>
           </a:xfrm>
           <a:prstGeom prst="rect">
@@ -6856,7 +7273,7 @@
         <p:spPr>
           <a:xfrm>
             <a:off x="457200" y="4572000"/>
-            <a:ext cx="8229600" cy="640080"/>
+            <a:ext cx="8229600" cy="415636"/>
           </a:xfrm>
           <a:prstGeom prst="rect">
             <a:avLst/>
@@ -6911,7 +7328,7 @@
 </file>
 
 <file path=ppt/slides/slide16.xml><?xml version="1.0" encoding="utf-8"?>
-<p:sld xmlns:a="http://schemas.openxmlformats.org/drawingml/2006/main" xmlns:p="http://schemas.openxmlformats.org/presentationml/2006/main" xmlns:r="http://schemas.openxmlformats.org/officeDocument/2006/relationships">
+<p:sld xmlns:a="http://schemas.openxmlformats.org/drawingml/2006/main" xmlns:r="http://schemas.openxmlformats.org/officeDocument/2006/relationships" xmlns:p="http://schemas.openxmlformats.org/presentationml/2006/main">
   <p:cSld>
     <p:spTree>
       <p:nvGrpSpPr>
@@ -6919,7 +7336,14 @@
         <p:cNvGrpSpPr/>
         <p:nvPr/>
       </p:nvGrpSpPr>
-      <p:grpSpPr/>
+      <p:grpSpPr>
+        <a:xfrm>
+          <a:off x="0" y="0"/>
+          <a:ext cx="0" cy="0"/>
+          <a:chOff x="0" y="0"/>
+          <a:chExt cx="0" cy="0"/>
+        </a:xfrm>
+      </p:grpSpPr>
       <p:sp>
         <p:nvSpPr>
           <p:cNvPr id="2" name="Rectangle 1"/>
@@ -6960,6 +7384,7 @@
           <a:lstStyle/>
           <a:p>
             <a:pPr algn="ctr"/>
+            <a:endParaRPr/>
           </a:p>
         </p:txBody>
       </p:sp>
@@ -7052,7 +7477,7 @@
           <a:noFill/>
         </p:spPr>
         <p:txBody>
-          <a:bodyPr wrap="square" lIns="182880" rIns="182880" tIns="91440" bIns="91440">
+          <a:bodyPr wrap="square" lIns="182880" tIns="91440" rIns="182880" bIns="91440">
             <a:spAutoFit/>
           </a:bodyPr>
           <a:lstStyle/>
@@ -7143,7 +7568,7 @@
           <a:noFill/>
         </p:spPr>
         <p:txBody>
-          <a:bodyPr wrap="square" lIns="182880" rIns="182880" tIns="91440" bIns="91440">
+          <a:bodyPr wrap="square" lIns="182880" tIns="91440" rIns="182880" bIns="91440">
             <a:spAutoFit/>
           </a:bodyPr>
           <a:lstStyle/>
@@ -7298,7 +7723,7 @@
 </file>
 
 <file path=ppt/slides/slide2.xml><?xml version="1.0" encoding="utf-8"?>
-<p:sld xmlns:a="http://schemas.openxmlformats.org/drawingml/2006/main" xmlns:p="http://schemas.openxmlformats.org/presentationml/2006/main" xmlns:r="http://schemas.openxmlformats.org/officeDocument/2006/relationships">
+<p:sld xmlns:a="http://schemas.openxmlformats.org/drawingml/2006/main" xmlns:r="http://schemas.openxmlformats.org/officeDocument/2006/relationships" xmlns:p="http://schemas.openxmlformats.org/presentationml/2006/main">
   <p:cSld>
     <p:spTree>
       <p:nvGrpSpPr>
@@ -7306,7 +7731,14 @@
         <p:cNvGrpSpPr/>
         <p:nvPr/>
       </p:nvGrpSpPr>
-      <p:grpSpPr/>
+      <p:grpSpPr>
+        <a:xfrm>
+          <a:off x="0" y="0"/>
+          <a:ext cx="0" cy="0"/>
+          <a:chOff x="0" y="0"/>
+          <a:chExt cx="0" cy="0"/>
+        </a:xfrm>
+      </p:grpSpPr>
       <p:sp>
         <p:nvSpPr>
           <p:cNvPr id="2" name="Rectangle 1"/>
@@ -7347,6 +7779,7 @@
           <a:lstStyle/>
           <a:p>
             <a:pPr algn="ctr"/>
+            <a:endParaRPr/>
           </a:p>
         </p:txBody>
       </p:sp>
@@ -7503,7 +7936,7 @@
 </file>
 
 <file path=ppt/slides/slide3.xml><?xml version="1.0" encoding="utf-8"?>
-<p:sld xmlns:a="http://schemas.openxmlformats.org/drawingml/2006/main" xmlns:p="http://schemas.openxmlformats.org/presentationml/2006/main" xmlns:r="http://schemas.openxmlformats.org/officeDocument/2006/relationships">
+<p:sld xmlns:a="http://schemas.openxmlformats.org/drawingml/2006/main" xmlns:r="http://schemas.openxmlformats.org/officeDocument/2006/relationships" xmlns:p="http://schemas.openxmlformats.org/presentationml/2006/main">
   <p:cSld>
     <p:spTree>
       <p:nvGrpSpPr>
@@ -7511,7 +7944,14 @@
         <p:cNvGrpSpPr/>
         <p:nvPr/>
       </p:nvGrpSpPr>
-      <p:grpSpPr/>
+      <p:grpSpPr>
+        <a:xfrm>
+          <a:off x="0" y="0"/>
+          <a:ext cx="0" cy="0"/>
+          <a:chOff x="0" y="0"/>
+          <a:chExt cx="0" cy="0"/>
+        </a:xfrm>
+      </p:grpSpPr>
       <p:sp>
         <p:nvSpPr>
           <p:cNvPr id="2" name="Rectangle 1"/>
@@ -7552,6 +7992,7 @@
           <a:lstStyle/>
           <a:p>
             <a:pPr algn="ctr"/>
+            <a:endParaRPr/>
           </a:p>
         </p:txBody>
       </p:sp>
@@ -7633,6 +8074,7 @@
           <a:lstStyle/>
           <a:p>
             <a:pPr algn="ctr"/>
+            <a:endParaRPr/>
           </a:p>
         </p:txBody>
       </p:sp>
@@ -7750,6 +8192,7 @@
           <a:lstStyle/>
           <a:p>
             <a:pPr algn="ctr"/>
+            <a:endParaRPr/>
           </a:p>
         </p:txBody>
       </p:sp>
@@ -7867,6 +8310,7 @@
           <a:lstStyle/>
           <a:p>
             <a:pPr algn="ctr"/>
+            <a:endParaRPr/>
           </a:p>
         </p:txBody>
       </p:sp>
@@ -7984,6 +8428,7 @@
           <a:lstStyle/>
           <a:p>
             <a:pPr algn="ctr"/>
+            <a:endParaRPr/>
           </a:p>
         </p:txBody>
       </p:sp>
@@ -8068,7 +8513,7 @@
 </file>
 
 <file path=ppt/slides/slide4.xml><?xml version="1.0" encoding="utf-8"?>
-<p:sld xmlns:a="http://schemas.openxmlformats.org/drawingml/2006/main" xmlns:p="http://schemas.openxmlformats.org/presentationml/2006/main" xmlns:r="http://schemas.openxmlformats.org/officeDocument/2006/relationships">
+<p:sld xmlns:a="http://schemas.openxmlformats.org/drawingml/2006/main" xmlns:r="http://schemas.openxmlformats.org/officeDocument/2006/relationships" xmlns:p="http://schemas.openxmlformats.org/presentationml/2006/main">
   <p:cSld>
     <p:spTree>
       <p:nvGrpSpPr>
@@ -8076,7 +8521,14 @@
         <p:cNvGrpSpPr/>
         <p:nvPr/>
       </p:nvGrpSpPr>
-      <p:grpSpPr/>
+      <p:grpSpPr>
+        <a:xfrm>
+          <a:off x="0" y="0"/>
+          <a:ext cx="0" cy="0"/>
+          <a:chOff x="0" y="0"/>
+          <a:chExt cx="0" cy="0"/>
+        </a:xfrm>
+      </p:grpSpPr>
       <p:sp>
         <p:nvSpPr>
           <p:cNvPr id="2" name="TextBox 1"/>
@@ -8230,7 +8682,7 @@
 </file>
 
 <file path=ppt/slides/slide5.xml><?xml version="1.0" encoding="utf-8"?>
-<p:sld xmlns:a="http://schemas.openxmlformats.org/drawingml/2006/main" xmlns:p="http://schemas.openxmlformats.org/presentationml/2006/main" xmlns:r="http://schemas.openxmlformats.org/officeDocument/2006/relationships">
+<p:sld xmlns:a="http://schemas.openxmlformats.org/drawingml/2006/main" xmlns:r="http://schemas.openxmlformats.org/officeDocument/2006/relationships" xmlns:p="http://schemas.openxmlformats.org/presentationml/2006/main">
   <p:cSld>
     <p:spTree>
       <p:nvGrpSpPr>
@@ -8238,7 +8690,14 @@
         <p:cNvGrpSpPr/>
         <p:nvPr/>
       </p:nvGrpSpPr>
-      <p:grpSpPr/>
+      <p:grpSpPr>
+        <a:xfrm>
+          <a:off x="0" y="0"/>
+          <a:ext cx="0" cy="0"/>
+          <a:chOff x="0" y="0"/>
+          <a:chExt cx="0" cy="0"/>
+        </a:xfrm>
+      </p:grpSpPr>
       <p:sp>
         <p:nvSpPr>
           <p:cNvPr id="2" name="Rectangle 1"/>
@@ -8279,6 +8738,7 @@
           <a:lstStyle/>
           <a:p>
             <a:pPr algn="ctr"/>
+            <a:endParaRPr/>
           </a:p>
         </p:txBody>
       </p:sp>
@@ -8360,6 +8820,7 @@
           <a:lstStyle/>
           <a:p>
             <a:pPr algn="ctr"/>
+            <a:endParaRPr/>
           </a:p>
         </p:txBody>
       </p:sp>
@@ -8513,6 +8974,7 @@
           <a:lstStyle/>
           <a:p>
             <a:pPr algn="ctr"/>
+            <a:endParaRPr/>
           </a:p>
         </p:txBody>
       </p:sp>
@@ -8666,6 +9128,7 @@
           <a:lstStyle/>
           <a:p>
             <a:pPr algn="ctr"/>
+            <a:endParaRPr/>
           </a:p>
         </p:txBody>
       </p:sp>
@@ -8750,7 +9213,7 @@
         <p:spPr>
           <a:xfrm>
             <a:off x="5760720" y="2926080"/>
-            <a:ext cx="2011680" cy="548640"/>
+            <a:ext cx="2011680" cy="1077218"/>
           </a:xfrm>
           <a:prstGeom prst="rect">
             <a:avLst/>
@@ -8772,8 +9235,14 @@
               </a:defRPr>
             </a:pPr>
             <a:r>
-              <a:t>~$7.34M breach exposure avoided</a:t>
-            </a:r>
+              <a:rPr dirty="0"/>
+              <a:t>~$7.34M </a:t>
+            </a:r>
+            <a:r>
+              <a:rPr sz="2000" dirty="0"/>
+              <a:t>breach exposure avoided</a:t>
+            </a:r>
+            <a:endParaRPr dirty="0"/>
           </a:p>
         </p:txBody>
       </p:sp>
@@ -8822,7 +9291,7 @@
 </file>
 
 <file path=ppt/slides/slide6.xml><?xml version="1.0" encoding="utf-8"?>
-<p:sld xmlns:a="http://schemas.openxmlformats.org/drawingml/2006/main" xmlns:p="http://schemas.openxmlformats.org/presentationml/2006/main" xmlns:r="http://schemas.openxmlformats.org/officeDocument/2006/relationships">
+<p:sld xmlns:a="http://schemas.openxmlformats.org/drawingml/2006/main" xmlns:r="http://schemas.openxmlformats.org/officeDocument/2006/relationships" xmlns:p="http://schemas.openxmlformats.org/presentationml/2006/main">
   <p:cSld>
     <p:spTree>
       <p:nvGrpSpPr>
@@ -8830,7 +9299,14 @@
         <p:cNvGrpSpPr/>
         <p:nvPr/>
       </p:nvGrpSpPr>
-      <p:grpSpPr/>
+      <p:grpSpPr>
+        <a:xfrm>
+          <a:off x="0" y="0"/>
+          <a:ext cx="0" cy="0"/>
+          <a:chOff x="0" y="0"/>
+          <a:chExt cx="0" cy="0"/>
+        </a:xfrm>
+      </p:grpSpPr>
       <p:sp>
         <p:nvSpPr>
           <p:cNvPr id="2" name="Rectangle 1"/>
@@ -8871,6 +9347,7 @@
           <a:lstStyle/>
           <a:p>
             <a:pPr algn="ctr"/>
+            <a:endParaRPr/>
           </a:p>
         </p:txBody>
       </p:sp>
@@ -8927,7 +9404,7 @@
           <a:noFill/>
         </p:spPr>
         <p:txBody>
-          <a:bodyPr wrap="square" lIns="274320" rIns="274320" tIns="182880" bIns="182880">
+          <a:bodyPr wrap="square" lIns="274320" tIns="182880" rIns="274320" bIns="182880">
             <a:spAutoFit/>
           </a:bodyPr>
           <a:lstStyle/>
@@ -9070,7 +9547,7 @@
 </file>
 
 <file path=ppt/slides/slide7.xml><?xml version="1.0" encoding="utf-8"?>
-<p:sld xmlns:a="http://schemas.openxmlformats.org/drawingml/2006/main" xmlns:p="http://schemas.openxmlformats.org/presentationml/2006/main" xmlns:r="http://schemas.openxmlformats.org/officeDocument/2006/relationships">
+<p:sld xmlns:a="http://schemas.openxmlformats.org/drawingml/2006/main" xmlns:r="http://schemas.openxmlformats.org/officeDocument/2006/relationships" xmlns:p="http://schemas.openxmlformats.org/presentationml/2006/main">
   <p:cSld>
     <p:spTree>
       <p:nvGrpSpPr>
@@ -9078,7 +9555,14 @@
         <p:cNvGrpSpPr/>
         <p:nvPr/>
       </p:nvGrpSpPr>
-      <p:grpSpPr/>
+      <p:grpSpPr>
+        <a:xfrm>
+          <a:off x="0" y="0"/>
+          <a:ext cx="0" cy="0"/>
+          <a:chOff x="0" y="0"/>
+          <a:chExt cx="0" cy="0"/>
+        </a:xfrm>
+      </p:grpSpPr>
       <p:sp>
         <p:nvSpPr>
           <p:cNvPr id="2" name="Rectangle 1"/>
@@ -9119,6 +9603,7 @@
           <a:lstStyle/>
           <a:p>
             <a:pPr algn="ctr"/>
+            <a:endParaRPr/>
           </a:p>
         </p:txBody>
       </p:sp>
@@ -9203,7 +9688,7 @@
         <p:spPr>
           <a:xfrm>
             <a:off x="731520" y="4480560"/>
-            <a:ext cx="7680960" cy="731520"/>
+            <a:ext cx="7680960" cy="457200"/>
           </a:xfrm>
           <a:prstGeom prst="rect">
             <a:avLst/>
@@ -9265,8 +9750,8 @@
         </p:blipFill>
         <p:spPr>
           <a:xfrm>
-            <a:off x="731520" y="1097280"/>
-            <a:ext cx="7680960" cy="2560320"/>
+            <a:off x="2011680" y="1097280"/>
+            <a:ext cx="5120640" cy="2560320"/>
           </a:xfrm>
           <a:prstGeom prst="rect">
             <a:avLst/>
@@ -9282,7 +9767,7 @@
 </file>
 
 <file path=ppt/slides/slide8.xml><?xml version="1.0" encoding="utf-8"?>
-<p:sld xmlns:a="http://schemas.openxmlformats.org/drawingml/2006/main" xmlns:p="http://schemas.openxmlformats.org/presentationml/2006/main" xmlns:r="http://schemas.openxmlformats.org/officeDocument/2006/relationships">
+<p:sld xmlns:a="http://schemas.openxmlformats.org/drawingml/2006/main" xmlns:r="http://schemas.openxmlformats.org/officeDocument/2006/relationships" xmlns:p="http://schemas.openxmlformats.org/presentationml/2006/main">
   <p:cSld>
     <p:spTree>
       <p:nvGrpSpPr>
@@ -9290,7 +9775,14 @@
         <p:cNvGrpSpPr/>
         <p:nvPr/>
       </p:nvGrpSpPr>
-      <p:grpSpPr/>
+      <p:grpSpPr>
+        <a:xfrm>
+          <a:off x="0" y="0"/>
+          <a:ext cx="0" cy="0"/>
+          <a:chOff x="0" y="0"/>
+          <a:chExt cx="0" cy="0"/>
+        </a:xfrm>
+      </p:grpSpPr>
       <p:sp>
         <p:nvSpPr>
           <p:cNvPr id="2" name="Rectangle 1"/>
@@ -9331,6 +9823,7 @@
           <a:lstStyle/>
           <a:p>
             <a:pPr algn="ctr"/>
+            <a:endParaRPr/>
           </a:p>
         </p:txBody>
       </p:sp>
@@ -9410,6 +9903,7 @@
           <a:lstStyle/>
           <a:p>
             <a:pPr algn="ctr"/>
+            <a:endParaRPr/>
           </a:p>
         </p:txBody>
       </p:sp>
@@ -9597,6 +10091,7 @@
           <a:lstStyle/>
           <a:p>
             <a:pPr algn="ctr"/>
+            <a:endParaRPr/>
           </a:p>
         </p:txBody>
       </p:sp>
@@ -9748,6 +10243,7 @@
           <a:lstStyle/>
           <a:p>
             <a:pPr algn="ctr"/>
+            <a:endParaRPr/>
           </a:p>
         </p:txBody>
       </p:sp>
@@ -9935,6 +10431,7 @@
           <a:lstStyle/>
           <a:p>
             <a:pPr algn="ctr"/>
+            <a:endParaRPr/>
           </a:p>
         </p:txBody>
       </p:sp>
@@ -10014,6 +10511,7 @@
           <a:lstStyle/>
           <a:p>
             <a:pPr algn="ctr"/>
+            <a:endParaRPr/>
           </a:p>
         </p:txBody>
       </p:sp>
@@ -10165,6 +10663,7 @@
           <a:lstStyle/>
           <a:p>
             <a:pPr algn="ctr"/>
+            <a:endParaRPr/>
           </a:p>
         </p:txBody>
       </p:sp>
@@ -10213,7 +10712,7 @@
 </file>
 
 <file path=ppt/slides/slide9.xml><?xml version="1.0" encoding="utf-8"?>
-<p:sld xmlns:a="http://schemas.openxmlformats.org/drawingml/2006/main" xmlns:p="http://schemas.openxmlformats.org/presentationml/2006/main" xmlns:r="http://schemas.openxmlformats.org/officeDocument/2006/relationships">
+<p:sld xmlns:a="http://schemas.openxmlformats.org/drawingml/2006/main" xmlns:r="http://schemas.openxmlformats.org/officeDocument/2006/relationships" xmlns:p="http://schemas.openxmlformats.org/presentationml/2006/main">
   <p:cSld>
     <p:spTree>
       <p:nvGrpSpPr>
@@ -10221,7 +10720,14 @@
         <p:cNvGrpSpPr/>
         <p:nvPr/>
       </p:nvGrpSpPr>
-      <p:grpSpPr/>
+      <p:grpSpPr>
+        <a:xfrm>
+          <a:off x="0" y="0"/>
+          <a:ext cx="0" cy="0"/>
+          <a:chOff x="0" y="0"/>
+          <a:chExt cx="0" cy="0"/>
+        </a:xfrm>
+      </p:grpSpPr>
       <p:sp>
         <p:nvSpPr>
           <p:cNvPr id="2" name="Rectangle 1"/>
@@ -10262,6 +10768,7 @@
           <a:lstStyle/>
           <a:p>
             <a:pPr algn="ctr"/>
+            <a:endParaRPr/>
           </a:p>
         </p:txBody>
       </p:sp>
@@ -10301,465 +10808,489 @@
           </a:p>
         </p:txBody>
       </p:sp>
-      <p:sp>
-        <p:nvSpPr>
-          <p:cNvPr id="4" name="Rectangle 3"/>
-          <p:cNvSpPr/>
-          <p:nvPr/>
-        </p:nvSpPr>
-        <p:spPr>
-          <a:xfrm>
-            <a:off x="457200" y="1188720"/>
-            <a:ext cx="2377440" cy="2743200"/>
-          </a:xfrm>
-          <a:prstGeom prst="rect">
-            <a:avLst/>
-          </a:prstGeom>
-          <a:solidFill>
-            <a:srgbClr val="F0F8FF"/>
-          </a:solidFill>
-          <a:ln w="38100">
+      <p:grpSp>
+        <p:nvGrpSpPr>
+          <p:cNvPr id="16" name="Group 15">
+            <a:extLst>
+              <a:ext uri="{FF2B5EF4-FFF2-40B4-BE49-F238E27FC236}">
+                <a16:creationId xmlns:a16="http://schemas.microsoft.com/office/drawing/2014/main" id="{2AF6AEF9-31E3-C749-2820-1F51F149BB0E}"/>
+              </a:ext>
+            </a:extLst>
+          </p:cNvPr>
+          <p:cNvGrpSpPr/>
+          <p:nvPr/>
+        </p:nvGrpSpPr>
+        <p:grpSpPr>
+          <a:xfrm>
+            <a:off x="822960" y="1200150"/>
+            <a:ext cx="7498080" cy="2743200"/>
+            <a:chOff x="457200" y="1188720"/>
+            <a:chExt cx="7498080" cy="2743200"/>
+          </a:xfrm>
+        </p:grpSpPr>
+        <p:sp>
+          <p:nvSpPr>
+            <p:cNvPr id="4" name="Rectangle 3"/>
+            <p:cNvSpPr/>
+            <p:nvPr/>
+          </p:nvSpPr>
+          <p:spPr>
+            <a:xfrm>
+              <a:off x="457200" y="1188720"/>
+              <a:ext cx="2377440" cy="2743200"/>
+            </a:xfrm>
+            <a:prstGeom prst="rect">
+              <a:avLst/>
+            </a:prstGeom>
             <a:solidFill>
-              <a:srgbClr val="009CDE"/>
+              <a:srgbClr val="F0F8FF"/>
             </a:solidFill>
-          </a:ln>
-        </p:spPr>
-        <p:style>
-          <a:lnRef idx="1">
-            <a:schemeClr val="accent1"/>
-          </a:lnRef>
-          <a:fillRef idx="3">
-            <a:schemeClr val="accent1"/>
-          </a:fillRef>
-          <a:effectRef idx="2">
-            <a:schemeClr val="accent1"/>
-          </a:effectRef>
-          <a:fontRef idx="minor">
-            <a:schemeClr val="lt1"/>
-          </a:fontRef>
-        </p:style>
-        <p:txBody>
-          <a:bodyPr rtlCol="0" anchor="ctr"/>
-          <a:lstStyle/>
-          <a:p>
-            <a:pPr algn="ctr"/>
-          </a:p>
-        </p:txBody>
-      </p:sp>
-      <p:sp>
-        <p:nvSpPr>
-          <p:cNvPr id="5" name="TextBox 4"/>
-          <p:cNvSpPr txBox="1"/>
-          <p:nvPr/>
-        </p:nvSpPr>
-        <p:spPr>
-          <a:xfrm>
-            <a:off x="640080" y="1463040"/>
-            <a:ext cx="2011680" cy="457200"/>
-          </a:xfrm>
-          <a:prstGeom prst="rect">
-            <a:avLst/>
-          </a:prstGeom>
-          <a:noFill/>
-        </p:spPr>
-        <p:txBody>
-          <a:bodyPr wrap="square">
-            <a:spAutoFit/>
-          </a:bodyPr>
-          <a:lstStyle/>
-          <a:p>
-            <a:pPr algn="ctr">
-              <a:defRPr sz="1800" b="1">
-                <a:solidFill>
-                  <a:srgbClr val="004C97"/>
-                </a:solidFill>
-                <a:latin typeface="Calibri"/>
-              </a:defRPr>
-            </a:pPr>
-            <a:r>
-              <a:t>Containment Rate</a:t>
-            </a:r>
-          </a:p>
-        </p:txBody>
-      </p:sp>
-      <p:sp>
-        <p:nvSpPr>
-          <p:cNvPr id="6" name="TextBox 5"/>
-          <p:cNvSpPr txBox="1"/>
-          <p:nvPr/>
-        </p:nvSpPr>
-        <p:spPr>
-          <a:xfrm>
-            <a:off x="640080" y="2103120"/>
-            <a:ext cx="2011680" cy="914400"/>
-          </a:xfrm>
-          <a:prstGeom prst="rect">
-            <a:avLst/>
-          </a:prstGeom>
-          <a:noFill/>
-        </p:spPr>
-        <p:txBody>
-          <a:bodyPr wrap="square">
-            <a:spAutoFit/>
-          </a:bodyPr>
-          <a:lstStyle/>
-          <a:p>
-            <a:pPr algn="ctr">
-              <a:defRPr sz="4800" b="1">
-                <a:solidFill>
-                  <a:srgbClr val="009CDE"/>
-                </a:solidFill>
-                <a:latin typeface="Calibri"/>
-              </a:defRPr>
-            </a:pPr>
-            <a:r>
-              <a:t>98%</a:t>
-            </a:r>
-          </a:p>
-        </p:txBody>
-      </p:sp>
-      <p:sp>
-        <p:nvSpPr>
-          <p:cNvPr id="7" name="TextBox 6"/>
-          <p:cNvSpPr txBox="1"/>
-          <p:nvPr/>
-        </p:nvSpPr>
-        <p:spPr>
-          <a:xfrm>
-            <a:off x="640080" y="3200400"/>
-            <a:ext cx="2011680" cy="548640"/>
-          </a:xfrm>
-          <a:prstGeom prst="rect">
-            <a:avLst/>
-          </a:prstGeom>
-          <a:noFill/>
-        </p:spPr>
-        <p:txBody>
-          <a:bodyPr wrap="square">
-            <a:spAutoFit/>
-          </a:bodyPr>
-          <a:lstStyle/>
-          <a:p>
-            <a:pPr algn="ctr">
-              <a:defRPr sz="1400">
-                <a:solidFill>
-                  <a:srgbClr val="343741"/>
-                </a:solidFill>
-                <a:latin typeface="Calibri"/>
-              </a:defRPr>
-            </a:pPr>
-            <a:r>
-              <a:t>(262 of 267)</a:t>
-            </a:r>
-          </a:p>
-        </p:txBody>
-      </p:sp>
-      <p:sp>
-        <p:nvSpPr>
-          <p:cNvPr id="8" name="Rectangle 7"/>
-          <p:cNvSpPr/>
-          <p:nvPr/>
-        </p:nvSpPr>
-        <p:spPr>
-          <a:xfrm>
-            <a:off x="3017520" y="1188720"/>
-            <a:ext cx="2377440" cy="2743200"/>
-          </a:xfrm>
-          <a:prstGeom prst="rect">
-            <a:avLst/>
-          </a:prstGeom>
-          <a:solidFill>
-            <a:srgbClr val="F0F8FF"/>
-          </a:solidFill>
-          <a:ln w="38100">
+            <a:ln w="38100">
+              <a:solidFill>
+                <a:srgbClr val="009CDE"/>
+              </a:solidFill>
+            </a:ln>
+          </p:spPr>
+          <p:style>
+            <a:lnRef idx="1">
+              <a:schemeClr val="accent1"/>
+            </a:lnRef>
+            <a:fillRef idx="3">
+              <a:schemeClr val="accent1"/>
+            </a:fillRef>
+            <a:effectRef idx="2">
+              <a:schemeClr val="accent1"/>
+            </a:effectRef>
+            <a:fontRef idx="minor">
+              <a:schemeClr val="lt1"/>
+            </a:fontRef>
+          </p:style>
+          <p:txBody>
+            <a:bodyPr rtlCol="0" anchor="ctr"/>
+            <a:lstStyle/>
+            <a:p>
+              <a:pPr algn="ctr"/>
+              <a:endParaRPr/>
+            </a:p>
+          </p:txBody>
+        </p:sp>
+        <p:sp>
+          <p:nvSpPr>
+            <p:cNvPr id="5" name="TextBox 4"/>
+            <p:cNvSpPr txBox="1"/>
+            <p:nvPr/>
+          </p:nvSpPr>
+          <p:spPr>
+            <a:xfrm>
+              <a:off x="640080" y="1463040"/>
+              <a:ext cx="2011680" cy="457200"/>
+            </a:xfrm>
+            <a:prstGeom prst="rect">
+              <a:avLst/>
+            </a:prstGeom>
+            <a:noFill/>
+          </p:spPr>
+          <p:txBody>
+            <a:bodyPr wrap="square">
+              <a:spAutoFit/>
+            </a:bodyPr>
+            <a:lstStyle/>
+            <a:p>
+              <a:pPr algn="ctr">
+                <a:defRPr sz="1800" b="1">
+                  <a:solidFill>
+                    <a:srgbClr val="004C97"/>
+                  </a:solidFill>
+                  <a:latin typeface="Calibri"/>
+                </a:defRPr>
+              </a:pPr>
+              <a:r>
+                <a:t>Containment Rate</a:t>
+              </a:r>
+            </a:p>
+          </p:txBody>
+        </p:sp>
+        <p:sp>
+          <p:nvSpPr>
+            <p:cNvPr id="6" name="TextBox 5"/>
+            <p:cNvSpPr txBox="1"/>
+            <p:nvPr/>
+          </p:nvSpPr>
+          <p:spPr>
+            <a:xfrm>
+              <a:off x="640080" y="2103120"/>
+              <a:ext cx="2011680" cy="914400"/>
+            </a:xfrm>
+            <a:prstGeom prst="rect">
+              <a:avLst/>
+            </a:prstGeom>
+            <a:noFill/>
+          </p:spPr>
+          <p:txBody>
+            <a:bodyPr wrap="square">
+              <a:spAutoFit/>
+            </a:bodyPr>
+            <a:lstStyle/>
+            <a:p>
+              <a:pPr algn="ctr">
+                <a:defRPr sz="4800" b="1">
+                  <a:solidFill>
+                    <a:srgbClr val="009CDE"/>
+                  </a:solidFill>
+                  <a:latin typeface="Calibri"/>
+                </a:defRPr>
+              </a:pPr>
+              <a:r>
+                <a:t>98%</a:t>
+              </a:r>
+            </a:p>
+          </p:txBody>
+        </p:sp>
+        <p:sp>
+          <p:nvSpPr>
+            <p:cNvPr id="7" name="TextBox 6"/>
+            <p:cNvSpPr txBox="1"/>
+            <p:nvPr/>
+          </p:nvSpPr>
+          <p:spPr>
+            <a:xfrm>
+              <a:off x="640080" y="3200400"/>
+              <a:ext cx="2011680" cy="548640"/>
+            </a:xfrm>
+            <a:prstGeom prst="rect">
+              <a:avLst/>
+            </a:prstGeom>
+            <a:noFill/>
+          </p:spPr>
+          <p:txBody>
+            <a:bodyPr wrap="square">
+              <a:spAutoFit/>
+            </a:bodyPr>
+            <a:lstStyle/>
+            <a:p>
+              <a:pPr algn="ctr">
+                <a:defRPr sz="1400">
+                  <a:solidFill>
+                    <a:srgbClr val="343741"/>
+                  </a:solidFill>
+                  <a:latin typeface="Calibri"/>
+                </a:defRPr>
+              </a:pPr>
+              <a:r>
+                <a:t>(262 of 267)</a:t>
+              </a:r>
+            </a:p>
+          </p:txBody>
+        </p:sp>
+        <p:sp>
+          <p:nvSpPr>
+            <p:cNvPr id="8" name="Rectangle 7"/>
+            <p:cNvSpPr/>
+            <p:nvPr/>
+          </p:nvSpPr>
+          <p:spPr>
+            <a:xfrm>
+              <a:off x="3017520" y="1188720"/>
+              <a:ext cx="2377440" cy="2743200"/>
+            </a:xfrm>
+            <a:prstGeom prst="rect">
+              <a:avLst/>
+            </a:prstGeom>
             <a:solidFill>
-              <a:srgbClr val="009CDE"/>
+              <a:srgbClr val="F0F8FF"/>
             </a:solidFill>
-          </a:ln>
-        </p:spPr>
-        <p:style>
-          <a:lnRef idx="1">
-            <a:schemeClr val="accent1"/>
-          </a:lnRef>
-          <a:fillRef idx="3">
-            <a:schemeClr val="accent1"/>
-          </a:fillRef>
-          <a:effectRef idx="2">
-            <a:schemeClr val="accent1"/>
-          </a:effectRef>
-          <a:fontRef idx="minor">
-            <a:schemeClr val="lt1"/>
-          </a:fontRef>
-        </p:style>
-        <p:txBody>
-          <a:bodyPr rtlCol="0" anchor="ctr"/>
-          <a:lstStyle/>
-          <a:p>
-            <a:pPr algn="ctr"/>
-          </a:p>
-        </p:txBody>
-      </p:sp>
-      <p:sp>
-        <p:nvSpPr>
-          <p:cNvPr id="9" name="TextBox 8"/>
-          <p:cNvSpPr txBox="1"/>
-          <p:nvPr/>
-        </p:nvSpPr>
-        <p:spPr>
-          <a:xfrm>
-            <a:off x="3200400" y="1463040"/>
-            <a:ext cx="2011680" cy="457200"/>
-          </a:xfrm>
-          <a:prstGeom prst="rect">
-            <a:avLst/>
-          </a:prstGeom>
-          <a:noFill/>
-        </p:spPr>
-        <p:txBody>
-          <a:bodyPr wrap="square">
-            <a:spAutoFit/>
-          </a:bodyPr>
-          <a:lstStyle/>
-          <a:p>
-            <a:pPr algn="ctr">
-              <a:defRPr sz="1800" b="1">
-                <a:solidFill>
-                  <a:srgbClr val="004C97"/>
-                </a:solidFill>
-                <a:latin typeface="Calibri"/>
-              </a:defRPr>
-            </a:pPr>
-            <a:r>
-              <a:t>Playbook Automation</a:t>
-            </a:r>
-          </a:p>
-        </p:txBody>
-      </p:sp>
-      <p:sp>
-        <p:nvSpPr>
-          <p:cNvPr id="10" name="TextBox 9"/>
-          <p:cNvSpPr txBox="1"/>
-          <p:nvPr/>
-        </p:nvSpPr>
-        <p:spPr>
-          <a:xfrm>
-            <a:off x="3200400" y="2103120"/>
-            <a:ext cx="2011680" cy="914400"/>
-          </a:xfrm>
-          <a:prstGeom prst="rect">
-            <a:avLst/>
-          </a:prstGeom>
-          <a:noFill/>
-        </p:spPr>
-        <p:txBody>
-          <a:bodyPr wrap="square">
-            <a:spAutoFit/>
-          </a:bodyPr>
-          <a:lstStyle/>
-          <a:p>
-            <a:pPr algn="ctr">
-              <a:defRPr sz="4800" b="1">
-                <a:solidFill>
-                  <a:srgbClr val="009CDE"/>
-                </a:solidFill>
-                <a:latin typeface="Calibri"/>
-              </a:defRPr>
-            </a:pPr>
-            <a:r>
-              <a:t>86%</a:t>
-            </a:r>
-          </a:p>
-        </p:txBody>
-      </p:sp>
-      <p:sp>
-        <p:nvSpPr>
-          <p:cNvPr id="11" name="TextBox 10"/>
-          <p:cNvSpPr txBox="1"/>
-          <p:nvPr/>
-        </p:nvSpPr>
-        <p:spPr>
-          <a:xfrm>
-            <a:off x="3200400" y="3200400"/>
-            <a:ext cx="2011680" cy="548640"/>
-          </a:xfrm>
-          <a:prstGeom prst="rect">
-            <a:avLst/>
-          </a:prstGeom>
-          <a:noFill/>
-        </p:spPr>
-        <p:txBody>
-          <a:bodyPr wrap="square">
-            <a:spAutoFit/>
-          </a:bodyPr>
-          <a:lstStyle/>
-          <a:p>
-            <a:pPr algn="ctr">
-              <a:defRPr sz="1400">
-                <a:solidFill>
-                  <a:srgbClr val="343741"/>
-                </a:solidFill>
-                <a:latin typeface="Calibri"/>
-              </a:defRPr>
-            </a:pPr>
-            <a:r>
-              <a:t>(229 incidents)</a:t>
-            </a:r>
-          </a:p>
-        </p:txBody>
-      </p:sp>
-      <p:sp>
-        <p:nvSpPr>
-          <p:cNvPr id="12" name="Rectangle 11"/>
-          <p:cNvSpPr/>
-          <p:nvPr/>
-        </p:nvSpPr>
-        <p:spPr>
-          <a:xfrm>
-            <a:off x="5577840" y="1188720"/>
-            <a:ext cx="2377440" cy="2743200"/>
-          </a:xfrm>
-          <a:prstGeom prst="rect">
-            <a:avLst/>
-          </a:prstGeom>
-          <a:solidFill>
-            <a:srgbClr val="F0F8FF"/>
-          </a:solidFill>
-          <a:ln w="38100">
+            <a:ln w="38100">
+              <a:solidFill>
+                <a:srgbClr val="009CDE"/>
+              </a:solidFill>
+            </a:ln>
+          </p:spPr>
+          <p:style>
+            <a:lnRef idx="1">
+              <a:schemeClr val="accent1"/>
+            </a:lnRef>
+            <a:fillRef idx="3">
+              <a:schemeClr val="accent1"/>
+            </a:fillRef>
+            <a:effectRef idx="2">
+              <a:schemeClr val="accent1"/>
+            </a:effectRef>
+            <a:fontRef idx="minor">
+              <a:schemeClr val="lt1"/>
+            </a:fontRef>
+          </p:style>
+          <p:txBody>
+            <a:bodyPr rtlCol="0" anchor="ctr"/>
+            <a:lstStyle/>
+            <a:p>
+              <a:pPr algn="ctr"/>
+              <a:endParaRPr/>
+            </a:p>
+          </p:txBody>
+        </p:sp>
+        <p:sp>
+          <p:nvSpPr>
+            <p:cNvPr id="9" name="TextBox 8"/>
+            <p:cNvSpPr txBox="1"/>
+            <p:nvPr/>
+          </p:nvSpPr>
+          <p:spPr>
+            <a:xfrm>
+              <a:off x="3200400" y="1463040"/>
+              <a:ext cx="2011680" cy="457200"/>
+            </a:xfrm>
+            <a:prstGeom prst="rect">
+              <a:avLst/>
+            </a:prstGeom>
+            <a:noFill/>
+          </p:spPr>
+          <p:txBody>
+            <a:bodyPr wrap="square">
+              <a:spAutoFit/>
+            </a:bodyPr>
+            <a:lstStyle/>
+            <a:p>
+              <a:pPr algn="ctr">
+                <a:defRPr sz="1800" b="1">
+                  <a:solidFill>
+                    <a:srgbClr val="004C97"/>
+                  </a:solidFill>
+                  <a:latin typeface="Calibri"/>
+                </a:defRPr>
+              </a:pPr>
+              <a:r>
+                <a:t>Playbook Automation</a:t>
+              </a:r>
+            </a:p>
+          </p:txBody>
+        </p:sp>
+        <p:sp>
+          <p:nvSpPr>
+            <p:cNvPr id="10" name="TextBox 9"/>
+            <p:cNvSpPr txBox="1"/>
+            <p:nvPr/>
+          </p:nvSpPr>
+          <p:spPr>
+            <a:xfrm>
+              <a:off x="3200400" y="2103120"/>
+              <a:ext cx="2011680" cy="914400"/>
+            </a:xfrm>
+            <a:prstGeom prst="rect">
+              <a:avLst/>
+            </a:prstGeom>
+            <a:noFill/>
+          </p:spPr>
+          <p:txBody>
+            <a:bodyPr wrap="square">
+              <a:spAutoFit/>
+            </a:bodyPr>
+            <a:lstStyle/>
+            <a:p>
+              <a:pPr algn="ctr">
+                <a:defRPr sz="4800" b="1">
+                  <a:solidFill>
+                    <a:srgbClr val="009CDE"/>
+                  </a:solidFill>
+                  <a:latin typeface="Calibri"/>
+                </a:defRPr>
+              </a:pPr>
+              <a:r>
+                <a:t>86%</a:t>
+              </a:r>
+            </a:p>
+          </p:txBody>
+        </p:sp>
+        <p:sp>
+          <p:nvSpPr>
+            <p:cNvPr id="11" name="TextBox 10"/>
+            <p:cNvSpPr txBox="1"/>
+            <p:nvPr/>
+          </p:nvSpPr>
+          <p:spPr>
+            <a:xfrm>
+              <a:off x="3200400" y="3200400"/>
+              <a:ext cx="2011680" cy="548640"/>
+            </a:xfrm>
+            <a:prstGeom prst="rect">
+              <a:avLst/>
+            </a:prstGeom>
+            <a:noFill/>
+          </p:spPr>
+          <p:txBody>
+            <a:bodyPr wrap="square">
+              <a:spAutoFit/>
+            </a:bodyPr>
+            <a:lstStyle/>
+            <a:p>
+              <a:pPr algn="ctr">
+                <a:defRPr sz="1400">
+                  <a:solidFill>
+                    <a:srgbClr val="343741"/>
+                  </a:solidFill>
+                  <a:latin typeface="Calibri"/>
+                </a:defRPr>
+              </a:pPr>
+              <a:r>
+                <a:t>(229 incidents)</a:t>
+              </a:r>
+            </a:p>
+          </p:txBody>
+        </p:sp>
+        <p:sp>
+          <p:nvSpPr>
+            <p:cNvPr id="12" name="Rectangle 11"/>
+            <p:cNvSpPr/>
+            <p:nvPr/>
+          </p:nvSpPr>
+          <p:spPr>
+            <a:xfrm>
+              <a:off x="5577840" y="1188720"/>
+              <a:ext cx="2377440" cy="2743200"/>
+            </a:xfrm>
+            <a:prstGeom prst="rect">
+              <a:avLst/>
+            </a:prstGeom>
             <a:solidFill>
-              <a:srgbClr val="FF6A14"/>
+              <a:srgbClr val="F0F8FF"/>
             </a:solidFill>
-          </a:ln>
-        </p:spPr>
-        <p:style>
-          <a:lnRef idx="1">
-            <a:schemeClr val="accent1"/>
-          </a:lnRef>
-          <a:fillRef idx="3">
-            <a:schemeClr val="accent1"/>
-          </a:fillRef>
-          <a:effectRef idx="2">
-            <a:schemeClr val="accent1"/>
-          </a:effectRef>
-          <a:fontRef idx="minor">
-            <a:schemeClr val="lt1"/>
-          </a:fontRef>
-        </p:style>
-        <p:txBody>
-          <a:bodyPr rtlCol="0" anchor="ctr"/>
-          <a:lstStyle/>
-          <a:p>
-            <a:pPr algn="ctr"/>
-          </a:p>
-        </p:txBody>
-      </p:sp>
-      <p:sp>
-        <p:nvSpPr>
-          <p:cNvPr id="13" name="TextBox 12"/>
-          <p:cNvSpPr txBox="1"/>
-          <p:nvPr/>
-        </p:nvSpPr>
-        <p:spPr>
-          <a:xfrm>
-            <a:off x="5760720" y="1463040"/>
-            <a:ext cx="2011680" cy="457200"/>
-          </a:xfrm>
-          <a:prstGeom prst="rect">
-            <a:avLst/>
-          </a:prstGeom>
-          <a:noFill/>
-        </p:spPr>
-        <p:txBody>
-          <a:bodyPr wrap="square">
-            <a:spAutoFit/>
-          </a:bodyPr>
-          <a:lstStyle/>
-          <a:p>
-            <a:pPr algn="ctr">
-              <a:defRPr sz="1800" b="1">
-                <a:solidFill>
-                  <a:srgbClr val="004C97"/>
-                </a:solidFill>
-                <a:latin typeface="Calibri"/>
-              </a:defRPr>
-            </a:pPr>
-            <a:r>
-              <a:t>Analyst Escalation</a:t>
-            </a:r>
-          </a:p>
-        </p:txBody>
-      </p:sp>
-      <p:sp>
-        <p:nvSpPr>
-          <p:cNvPr id="14" name="TextBox 13"/>
-          <p:cNvSpPr txBox="1"/>
-          <p:nvPr/>
-        </p:nvSpPr>
-        <p:spPr>
-          <a:xfrm>
-            <a:off x="5760720" y="2103120"/>
-            <a:ext cx="2011680" cy="914400"/>
-          </a:xfrm>
-          <a:prstGeom prst="rect">
-            <a:avLst/>
-          </a:prstGeom>
-          <a:noFill/>
-        </p:spPr>
-        <p:txBody>
-          <a:bodyPr wrap="square">
-            <a:spAutoFit/>
-          </a:bodyPr>
-          <a:lstStyle/>
-          <a:p>
-            <a:pPr algn="ctr">
-              <a:defRPr sz="4800" b="1">
-                <a:solidFill>
-                  <a:srgbClr val="FF6A14"/>
-                </a:solidFill>
-                <a:latin typeface="Calibri"/>
-              </a:defRPr>
-            </a:pPr>
-            <a:r>
-              <a:t>14%</a:t>
-            </a:r>
-          </a:p>
-        </p:txBody>
-      </p:sp>
-      <p:sp>
-        <p:nvSpPr>
-          <p:cNvPr id="15" name="TextBox 14"/>
-          <p:cNvSpPr txBox="1"/>
-          <p:nvPr/>
-        </p:nvSpPr>
-        <p:spPr>
-          <a:xfrm>
-            <a:off x="5760720" y="3200400"/>
-            <a:ext cx="2011680" cy="548640"/>
-          </a:xfrm>
-          <a:prstGeom prst="rect">
-            <a:avLst/>
-          </a:prstGeom>
-          <a:noFill/>
-        </p:spPr>
-        <p:txBody>
-          <a:bodyPr wrap="square">
-            <a:spAutoFit/>
-          </a:bodyPr>
-          <a:lstStyle/>
-          <a:p>
-            <a:pPr algn="ctr">
-              <a:defRPr sz="1400">
-                <a:solidFill>
-                  <a:srgbClr val="343741"/>
-                </a:solidFill>
-                <a:latin typeface="Calibri"/>
-              </a:defRPr>
-            </a:pPr>
-            <a:r>
-              <a:t>(38 incidents)</a:t>
-            </a:r>
-          </a:p>
-        </p:txBody>
-      </p:sp>
+            <a:ln w="38100">
+              <a:solidFill>
+                <a:srgbClr val="FF6A14"/>
+              </a:solidFill>
+            </a:ln>
+          </p:spPr>
+          <p:style>
+            <a:lnRef idx="1">
+              <a:schemeClr val="accent1"/>
+            </a:lnRef>
+            <a:fillRef idx="3">
+              <a:schemeClr val="accent1"/>
+            </a:fillRef>
+            <a:effectRef idx="2">
+              <a:schemeClr val="accent1"/>
+            </a:effectRef>
+            <a:fontRef idx="minor">
+              <a:schemeClr val="lt1"/>
+            </a:fontRef>
+          </p:style>
+          <p:txBody>
+            <a:bodyPr rtlCol="0" anchor="ctr"/>
+            <a:lstStyle/>
+            <a:p>
+              <a:pPr algn="ctr"/>
+              <a:endParaRPr/>
+            </a:p>
+          </p:txBody>
+        </p:sp>
+        <p:sp>
+          <p:nvSpPr>
+            <p:cNvPr id="13" name="TextBox 12"/>
+            <p:cNvSpPr txBox="1"/>
+            <p:nvPr/>
+          </p:nvSpPr>
+          <p:spPr>
+            <a:xfrm>
+              <a:off x="5760720" y="1463040"/>
+              <a:ext cx="2011680" cy="457200"/>
+            </a:xfrm>
+            <a:prstGeom prst="rect">
+              <a:avLst/>
+            </a:prstGeom>
+            <a:noFill/>
+          </p:spPr>
+          <p:txBody>
+            <a:bodyPr wrap="square">
+              <a:spAutoFit/>
+            </a:bodyPr>
+            <a:lstStyle/>
+            <a:p>
+              <a:pPr algn="ctr">
+                <a:defRPr sz="1800" b="1">
+                  <a:solidFill>
+                    <a:srgbClr val="004C97"/>
+                  </a:solidFill>
+                  <a:latin typeface="Calibri"/>
+                </a:defRPr>
+              </a:pPr>
+              <a:r>
+                <a:t>Analyst Escalation</a:t>
+              </a:r>
+            </a:p>
+          </p:txBody>
+        </p:sp>
+        <p:sp>
+          <p:nvSpPr>
+            <p:cNvPr id="14" name="TextBox 13"/>
+            <p:cNvSpPr txBox="1"/>
+            <p:nvPr/>
+          </p:nvSpPr>
+          <p:spPr>
+            <a:xfrm>
+              <a:off x="5760720" y="2103120"/>
+              <a:ext cx="2011680" cy="914400"/>
+            </a:xfrm>
+            <a:prstGeom prst="rect">
+              <a:avLst/>
+            </a:prstGeom>
+            <a:noFill/>
+          </p:spPr>
+          <p:txBody>
+            <a:bodyPr wrap="square">
+              <a:spAutoFit/>
+            </a:bodyPr>
+            <a:lstStyle/>
+            <a:p>
+              <a:pPr algn="ctr">
+                <a:defRPr sz="4800" b="1">
+                  <a:solidFill>
+                    <a:srgbClr val="FF6A14"/>
+                  </a:solidFill>
+                  <a:latin typeface="Calibri"/>
+                </a:defRPr>
+              </a:pPr>
+              <a:r>
+                <a:t>14%</a:t>
+              </a:r>
+            </a:p>
+          </p:txBody>
+        </p:sp>
+        <p:sp>
+          <p:nvSpPr>
+            <p:cNvPr id="15" name="TextBox 14"/>
+            <p:cNvSpPr txBox="1"/>
+            <p:nvPr/>
+          </p:nvSpPr>
+          <p:spPr>
+            <a:xfrm>
+              <a:off x="5760720" y="3200400"/>
+              <a:ext cx="2011680" cy="548640"/>
+            </a:xfrm>
+            <a:prstGeom prst="rect">
+              <a:avLst/>
+            </a:prstGeom>
+            <a:noFill/>
+          </p:spPr>
+          <p:txBody>
+            <a:bodyPr wrap="square">
+              <a:spAutoFit/>
+            </a:bodyPr>
+            <a:lstStyle/>
+            <a:p>
+              <a:pPr algn="ctr">
+                <a:defRPr sz="1400">
+                  <a:solidFill>
+                    <a:srgbClr val="343741"/>
+                  </a:solidFill>
+                  <a:latin typeface="Calibri"/>
+                </a:defRPr>
+              </a:pPr>
+              <a:r>
+                <a:t>(38 incidents)</a:t>
+              </a:r>
+            </a:p>
+          </p:txBody>
+        </p:sp>
+      </p:grpSp>
     </p:spTree>
   </p:cSld>
   <p:clrMapOvr>
@@ -11086,4 +11617,319 @@
   </a:objectDefaults>
   <a:extraClrSchemeLst/>
 </a:theme>
+</file>
+
+<file path=ppt/theme/theme2.xml><?xml version="1.0" encoding="utf-8"?>
+<a:theme xmlns:a="http://schemas.openxmlformats.org/drawingml/2006/main" name="Office Theme">
+  <a:themeElements>
+    <a:clrScheme name="Office">
+      <a:dk1>
+        <a:sysClr val="windowText" lastClr="000000"/>
+      </a:dk1>
+      <a:lt1>
+        <a:sysClr val="window" lastClr="FFFFFF"/>
+      </a:lt1>
+      <a:dk2>
+        <a:srgbClr val="0E2841"/>
+      </a:dk2>
+      <a:lt2>
+        <a:srgbClr val="E8E8E8"/>
+      </a:lt2>
+      <a:accent1>
+        <a:srgbClr val="156082"/>
+      </a:accent1>
+      <a:accent2>
+        <a:srgbClr val="E97132"/>
+      </a:accent2>
+      <a:accent3>
+        <a:srgbClr val="196B24"/>
+      </a:accent3>
+      <a:accent4>
+        <a:srgbClr val="0F9ED5"/>
+      </a:accent4>
+      <a:accent5>
+        <a:srgbClr val="A02B93"/>
+      </a:accent5>
+      <a:accent6>
+        <a:srgbClr val="4EA72E"/>
+      </a:accent6>
+      <a:hlink>
+        <a:srgbClr val="467886"/>
+      </a:hlink>
+      <a:folHlink>
+        <a:srgbClr val="96607D"/>
+      </a:folHlink>
+    </a:clrScheme>
+    <a:fontScheme name="Office">
+      <a:majorFont>
+        <a:latin typeface="Aptos Display" panose="02110004020202020204"/>
+        <a:ea typeface=""/>
+        <a:cs typeface=""/>
+        <a:font script="Jpan" typeface="游ゴシック Light"/>
+        <a:font script="Hang" typeface="맑은 고딕"/>
+        <a:font script="Hans" typeface="等线 Light"/>
+        <a:font script="Hant" typeface="新細明體"/>
+        <a:font script="Arab" typeface="Times New Roman"/>
+        <a:font script="Hebr" typeface="Times New Roman"/>
+        <a:font script="Thai" typeface="Angsana New"/>
+        <a:font script="Ethi" typeface="Nyala"/>
+        <a:font script="Beng" typeface="Vrinda"/>
+        <a:font script="Gujr" typeface="Shruti"/>
+        <a:font script="Khmr" typeface="MoolBoran"/>
+        <a:font script="Knda" typeface="Tunga"/>
+        <a:font script="Guru" typeface="Raavi"/>
+        <a:font script="Cans" typeface="Euphemia"/>
+        <a:font script="Cher" typeface="Plantagenet Cherokee"/>
+        <a:font script="Yiii" typeface="Microsoft Yi Baiti"/>
+        <a:font script="Tibt" typeface="Microsoft Himalaya"/>
+        <a:font script="Thaa" typeface="MV Boli"/>
+        <a:font script="Deva" typeface="Mangal"/>
+        <a:font script="Telu" typeface="Gautami"/>
+        <a:font script="Taml" typeface="Latha"/>
+        <a:font script="Syrc" typeface="Estrangelo Edessa"/>
+        <a:font script="Orya" typeface="Kalinga"/>
+        <a:font script="Mlym" typeface="Kartika"/>
+        <a:font script="Laoo" typeface="DokChampa"/>
+        <a:font script="Sinh" typeface="Iskoola Pota"/>
+        <a:font script="Mong" typeface="Mongolian Baiti"/>
+        <a:font script="Viet" typeface="Times New Roman"/>
+        <a:font script="Uigh" typeface="Microsoft Uighur"/>
+        <a:font script="Geor" typeface="Sylfaen"/>
+        <a:font script="Armn" typeface="Arial"/>
+        <a:font script="Bugi" typeface="Leelawadee UI"/>
+        <a:font script="Bopo" typeface="Microsoft JhengHei"/>
+        <a:font script="Java" typeface="Javanese Text"/>
+        <a:font script="Lisu" typeface="Segoe UI"/>
+        <a:font script="Mymr" typeface="Myanmar Text"/>
+        <a:font script="Nkoo" typeface="Ebrima"/>
+        <a:font script="Olck" typeface="Nirmala UI"/>
+        <a:font script="Osma" typeface="Ebrima"/>
+        <a:font script="Phag" typeface="Phagspa"/>
+        <a:font script="Syrn" typeface="Estrangelo Edessa"/>
+        <a:font script="Syrj" typeface="Estrangelo Edessa"/>
+        <a:font script="Syre" typeface="Estrangelo Edessa"/>
+        <a:font script="Sora" typeface="Nirmala UI"/>
+        <a:font script="Tale" typeface="Microsoft Tai Le"/>
+        <a:font script="Talu" typeface="Microsoft New Tai Lue"/>
+        <a:font script="Tfng" typeface="Ebrima"/>
+      </a:majorFont>
+      <a:minorFont>
+        <a:latin typeface="Aptos" panose="02110004020202020204"/>
+        <a:ea typeface=""/>
+        <a:cs typeface=""/>
+        <a:font script="Jpan" typeface="游ゴシック"/>
+        <a:font script="Hang" typeface="맑은 고딕"/>
+        <a:font script="Hans" typeface="等线"/>
+        <a:font script="Hant" typeface="新細明體"/>
+        <a:font script="Arab" typeface="Arial"/>
+        <a:font script="Hebr" typeface="Arial"/>
+        <a:font script="Thai" typeface="Cordia New"/>
+        <a:font script="Ethi" typeface="Nyala"/>
+        <a:font script="Beng" typeface="Vrinda"/>
+        <a:font script="Gujr" typeface="Shruti"/>
+        <a:font script="Khmr" typeface="DaunPenh"/>
+        <a:font script="Knda" typeface="Tunga"/>
+        <a:font script="Guru" typeface="Raavi"/>
+        <a:font script="Cans" typeface="Euphemia"/>
+        <a:font script="Cher" typeface="Plantagenet Cherokee"/>
+        <a:font script="Yiii" typeface="Microsoft Yi Baiti"/>
+        <a:font script="Tibt" typeface="Microsoft Himalaya"/>
+        <a:font script="Thaa" typeface="MV Boli"/>
+        <a:font script="Deva" typeface="Mangal"/>
+        <a:font script="Telu" typeface="Gautami"/>
+        <a:font script="Taml" typeface="Latha"/>
+        <a:font script="Syrc" typeface="Estrangelo Edessa"/>
+        <a:font script="Orya" typeface="Kalinga"/>
+        <a:font script="Mlym" typeface="Kartika"/>
+        <a:font script="Laoo" typeface="DokChampa"/>
+        <a:font script="Sinh" typeface="Iskoola Pota"/>
+        <a:font script="Mong" typeface="Mongolian Baiti"/>
+        <a:font script="Viet" typeface="Arial"/>
+        <a:font script="Uigh" typeface="Microsoft Uighur"/>
+        <a:font script="Geor" typeface="Sylfaen"/>
+        <a:font script="Armn" typeface="Arial"/>
+        <a:font script="Bugi" typeface="Leelawadee UI"/>
+        <a:font script="Bopo" typeface="Microsoft JhengHei"/>
+        <a:font script="Java" typeface="Javanese Text"/>
+        <a:font script="Lisu" typeface="Segoe UI"/>
+        <a:font script="Mymr" typeface="Myanmar Text"/>
+        <a:font script="Nkoo" typeface="Ebrima"/>
+        <a:font script="Olck" typeface="Nirmala UI"/>
+        <a:font script="Osma" typeface="Ebrima"/>
+        <a:font script="Phag" typeface="Phagspa"/>
+        <a:font script="Syrn" typeface="Estrangelo Edessa"/>
+        <a:font script="Syrj" typeface="Estrangelo Edessa"/>
+        <a:font script="Syre" typeface="Estrangelo Edessa"/>
+        <a:font script="Sora" typeface="Nirmala UI"/>
+        <a:font script="Tale" typeface="Microsoft Tai Le"/>
+        <a:font script="Talu" typeface="Microsoft New Tai Lue"/>
+        <a:font script="Tfng" typeface="Ebrima"/>
+      </a:minorFont>
+    </a:fontScheme>
+    <a:fmtScheme name="Office">
+      <a:fillStyleLst>
+        <a:solidFill>
+          <a:schemeClr val="phClr"/>
+        </a:solidFill>
+        <a:gradFill rotWithShape="1">
+          <a:gsLst>
+            <a:gs pos="0">
+              <a:schemeClr val="phClr">
+                <a:lumMod val="110000"/>
+                <a:satMod val="105000"/>
+                <a:tint val="67000"/>
+              </a:schemeClr>
+            </a:gs>
+            <a:gs pos="50000">
+              <a:schemeClr val="phClr">
+                <a:lumMod val="105000"/>
+                <a:satMod val="103000"/>
+                <a:tint val="73000"/>
+              </a:schemeClr>
+            </a:gs>
+            <a:gs pos="100000">
+              <a:schemeClr val="phClr">
+                <a:lumMod val="105000"/>
+                <a:satMod val="109000"/>
+                <a:tint val="81000"/>
+              </a:schemeClr>
+            </a:gs>
+          </a:gsLst>
+          <a:lin ang="5400000" scaled="0"/>
+        </a:gradFill>
+        <a:gradFill rotWithShape="1">
+          <a:gsLst>
+            <a:gs pos="0">
+              <a:schemeClr val="phClr">
+                <a:satMod val="103000"/>
+                <a:lumMod val="102000"/>
+                <a:tint val="94000"/>
+              </a:schemeClr>
+            </a:gs>
+            <a:gs pos="50000">
+              <a:schemeClr val="phClr">
+                <a:satMod val="110000"/>
+                <a:lumMod val="100000"/>
+                <a:shade val="100000"/>
+              </a:schemeClr>
+            </a:gs>
+            <a:gs pos="100000">
+              <a:schemeClr val="phClr">
+                <a:lumMod val="99000"/>
+                <a:satMod val="120000"/>
+                <a:shade val="78000"/>
+              </a:schemeClr>
+            </a:gs>
+          </a:gsLst>
+          <a:lin ang="5400000" scaled="0"/>
+        </a:gradFill>
+      </a:fillStyleLst>
+      <a:lnStyleLst>
+        <a:ln w="12700" cap="flat" cmpd="sng" algn="ctr">
+          <a:solidFill>
+            <a:schemeClr val="phClr"/>
+          </a:solidFill>
+          <a:prstDash val="solid"/>
+          <a:miter lim="800000"/>
+        </a:ln>
+        <a:ln w="19050" cap="flat" cmpd="sng" algn="ctr">
+          <a:solidFill>
+            <a:schemeClr val="phClr"/>
+          </a:solidFill>
+          <a:prstDash val="solid"/>
+          <a:miter lim="800000"/>
+        </a:ln>
+        <a:ln w="25400" cap="flat" cmpd="sng" algn="ctr">
+          <a:solidFill>
+            <a:schemeClr val="phClr"/>
+          </a:solidFill>
+          <a:prstDash val="solid"/>
+          <a:miter lim="800000"/>
+        </a:ln>
+      </a:lnStyleLst>
+      <a:effectStyleLst>
+        <a:effectStyle>
+          <a:effectLst/>
+        </a:effectStyle>
+        <a:effectStyle>
+          <a:effectLst/>
+        </a:effectStyle>
+        <a:effectStyle>
+          <a:effectLst>
+            <a:outerShdw blurRad="57150" dist="19050" dir="5400000" algn="ctr" rotWithShape="0">
+              <a:srgbClr val="000000">
+                <a:alpha val="63000"/>
+              </a:srgbClr>
+            </a:outerShdw>
+          </a:effectLst>
+        </a:effectStyle>
+      </a:effectStyleLst>
+      <a:bgFillStyleLst>
+        <a:solidFill>
+          <a:schemeClr val="phClr"/>
+        </a:solidFill>
+        <a:solidFill>
+          <a:schemeClr val="phClr">
+            <a:tint val="95000"/>
+            <a:satMod val="170000"/>
+          </a:schemeClr>
+        </a:solidFill>
+        <a:gradFill rotWithShape="1">
+          <a:gsLst>
+            <a:gs pos="0">
+              <a:schemeClr val="phClr">
+                <a:tint val="93000"/>
+                <a:satMod val="150000"/>
+                <a:shade val="98000"/>
+                <a:lumMod val="102000"/>
+              </a:schemeClr>
+            </a:gs>
+            <a:gs pos="50000">
+              <a:schemeClr val="phClr">
+                <a:tint val="98000"/>
+                <a:satMod val="130000"/>
+                <a:shade val="90000"/>
+                <a:lumMod val="103000"/>
+              </a:schemeClr>
+            </a:gs>
+            <a:gs pos="100000">
+              <a:schemeClr val="phClr">
+                <a:shade val="63000"/>
+                <a:satMod val="120000"/>
+              </a:schemeClr>
+            </a:gs>
+          </a:gsLst>
+          <a:lin ang="5400000" scaled="0"/>
+        </a:gradFill>
+      </a:bgFillStyleLst>
+    </a:fmtScheme>
+  </a:themeElements>
+  <a:objectDefaults>
+    <a:lnDef>
+      <a:spPr/>
+      <a:bodyPr/>
+      <a:lstStyle/>
+      <a:style>
+        <a:lnRef idx="2">
+          <a:schemeClr val="accent1"/>
+        </a:lnRef>
+        <a:fillRef idx="0">
+          <a:schemeClr val="accent1"/>
+        </a:fillRef>
+        <a:effectRef idx="1">
+          <a:schemeClr val="accent1"/>
+        </a:effectRef>
+        <a:fontRef idx="minor">
+          <a:schemeClr val="tx1"/>
+        </a:fontRef>
+      </a:style>
+    </a:lnDef>
+  </a:objectDefaults>
+  <a:extraClrSchemeLst/>
+  <a:extLst>
+    <a:ext uri="{05A4C25C-085E-4340-85A3-A5531E510DB2}">
+      <thm15:themeFamily xmlns:thm15="http://schemas.microsoft.com/office/thememl/2012/main" name="Office Theme" id="{2E142A2C-CD16-42D6-873A-C26D2A0506FA}" vid="{1BDDFF52-6CD6-40A5-AB3C-68EB2F1E4D0A}"/>
+    </a:ext>
+  </a:extLst>
+</a:theme>
 </file>
</xml_diff>